<commit_message>
add full process of run-job.sh
</commit_message>
<xml_diff>
--- a/Documentation/SamzaStructure.pptx
+++ b/Documentation/SamzaStructure.pptx
@@ -5,7 +5,7 @@
     <p:sldMasterId id="2147483648" r:id="rId1"/>
   </p:sldMasterIdLst>
   <p:notesMasterIdLst>
-    <p:notesMasterId r:id="rId15"/>
+    <p:notesMasterId r:id="rId17"/>
   </p:notesMasterIdLst>
   <p:sldIdLst>
     <p:sldId id="256" r:id="rId2"/>
@@ -13,14 +13,16 @@
     <p:sldId id="260" r:id="rId4"/>
     <p:sldId id="262" r:id="rId5"/>
     <p:sldId id="257" r:id="rId6"/>
-    <p:sldId id="258" r:id="rId7"/>
-    <p:sldId id="268" r:id="rId8"/>
-    <p:sldId id="269" r:id="rId9"/>
-    <p:sldId id="263" r:id="rId10"/>
-    <p:sldId id="264" r:id="rId11"/>
-    <p:sldId id="265" r:id="rId12"/>
-    <p:sldId id="266" r:id="rId13"/>
-    <p:sldId id="267" r:id="rId14"/>
+    <p:sldId id="270" r:id="rId7"/>
+    <p:sldId id="258" r:id="rId8"/>
+    <p:sldId id="268" r:id="rId9"/>
+    <p:sldId id="269" r:id="rId10"/>
+    <p:sldId id="271" r:id="rId11"/>
+    <p:sldId id="263" r:id="rId12"/>
+    <p:sldId id="264" r:id="rId13"/>
+    <p:sldId id="265" r:id="rId14"/>
+    <p:sldId id="266" r:id="rId15"/>
+    <p:sldId id="267" r:id="rId16"/>
   </p:sldIdLst>
   <p:sldSz cx="12192000" cy="6858000"/>
   <p:notesSz cx="6858000" cy="9144000"/>
@@ -133,6 +135,7 @@
           <p14:sldIdLst>
             <p14:sldId id="262"/>
             <p14:sldId id="257"/>
+            <p14:sldId id="270"/>
             <p14:sldId id="258"/>
             <p14:sldId id="268"/>
           </p14:sldIdLst>
@@ -140,6 +143,7 @@
         <p14:section name="Stand alone job" id="{8995E547-06EC-4D59-8961-90CC66602883}">
           <p14:sldIdLst>
             <p14:sldId id="269"/>
+            <p14:sldId id="271"/>
           </p14:sldIdLst>
         </p14:section>
         <p14:section name="Task" id="{A6BE1BE1-8715-4861-9F81-EBD747D5600C}">
@@ -246,7 +250,7 @@
           <a:p>
             <a:fld id="{B35ADF0B-9749-404D-9A56-8E2BD576143D}" type="datetimeFigureOut">
               <a:rPr lang="en-US" smtClean="0"/>
-              <a:t>11/6/2017</a:t>
+              <a:t>11/28/2017</a:t>
             </a:fld>
             <a:endParaRPr lang="en-US"/>
           </a:p>
@@ -663,7 +667,7 @@
           <a:p>
             <a:fld id="{339097E1-CCCB-4E56-BB56-9CF62DC970F1}" type="slidenum">
               <a:rPr lang="en-US" smtClean="0"/>
-              <a:t>10</a:t>
+              <a:t>12</a:t>
             </a:fld>
             <a:endParaRPr lang="en-US"/>
           </a:p>
@@ -813,7 +817,7 @@
           <a:p>
             <a:fld id="{7D2FF18F-DFC6-48DD-A8FE-22636A2E9C75}" type="datetimeFigureOut">
               <a:rPr lang="en-US" smtClean="0"/>
-              <a:t>11/6/2017</a:t>
+              <a:t>11/28/2017</a:t>
             </a:fld>
             <a:endParaRPr lang="en-US"/>
           </a:p>
@@ -983,7 +987,7 @@
           <a:p>
             <a:fld id="{7D2FF18F-DFC6-48DD-A8FE-22636A2E9C75}" type="datetimeFigureOut">
               <a:rPr lang="en-US" smtClean="0"/>
-              <a:t>11/6/2017</a:t>
+              <a:t>11/28/2017</a:t>
             </a:fld>
             <a:endParaRPr lang="en-US"/>
           </a:p>
@@ -1163,7 +1167,7 @@
           <a:p>
             <a:fld id="{7D2FF18F-DFC6-48DD-A8FE-22636A2E9C75}" type="datetimeFigureOut">
               <a:rPr lang="en-US" smtClean="0"/>
-              <a:t>11/6/2017</a:t>
+              <a:t>11/28/2017</a:t>
             </a:fld>
             <a:endParaRPr lang="en-US"/>
           </a:p>
@@ -1333,7 +1337,7 @@
           <a:p>
             <a:fld id="{7D2FF18F-DFC6-48DD-A8FE-22636A2E9C75}" type="datetimeFigureOut">
               <a:rPr lang="en-US" smtClean="0"/>
-              <a:t>11/6/2017</a:t>
+              <a:t>11/28/2017</a:t>
             </a:fld>
             <a:endParaRPr lang="en-US"/>
           </a:p>
@@ -1579,7 +1583,7 @@
           <a:p>
             <a:fld id="{7D2FF18F-DFC6-48DD-A8FE-22636A2E9C75}" type="datetimeFigureOut">
               <a:rPr lang="en-US" smtClean="0"/>
-              <a:t>11/6/2017</a:t>
+              <a:t>11/28/2017</a:t>
             </a:fld>
             <a:endParaRPr lang="en-US"/>
           </a:p>
@@ -1811,7 +1815,7 @@
           <a:p>
             <a:fld id="{7D2FF18F-DFC6-48DD-A8FE-22636A2E9C75}" type="datetimeFigureOut">
               <a:rPr lang="en-US" smtClean="0"/>
-              <a:t>11/6/2017</a:t>
+              <a:t>11/28/2017</a:t>
             </a:fld>
             <a:endParaRPr lang="en-US"/>
           </a:p>
@@ -2178,7 +2182,7 @@
           <a:p>
             <a:fld id="{7D2FF18F-DFC6-48DD-A8FE-22636A2E9C75}" type="datetimeFigureOut">
               <a:rPr lang="en-US" smtClean="0"/>
-              <a:t>11/6/2017</a:t>
+              <a:t>11/28/2017</a:t>
             </a:fld>
             <a:endParaRPr lang="en-US"/>
           </a:p>
@@ -2296,7 +2300,7 @@
           <a:p>
             <a:fld id="{7D2FF18F-DFC6-48DD-A8FE-22636A2E9C75}" type="datetimeFigureOut">
               <a:rPr lang="en-US" smtClean="0"/>
-              <a:t>11/6/2017</a:t>
+              <a:t>11/28/2017</a:t>
             </a:fld>
             <a:endParaRPr lang="en-US"/>
           </a:p>
@@ -2391,7 +2395,7 @@
           <a:p>
             <a:fld id="{7D2FF18F-DFC6-48DD-A8FE-22636A2E9C75}" type="datetimeFigureOut">
               <a:rPr lang="en-US" smtClean="0"/>
-              <a:t>11/6/2017</a:t>
+              <a:t>11/28/2017</a:t>
             </a:fld>
             <a:endParaRPr lang="en-US"/>
           </a:p>
@@ -2668,7 +2672,7 @@
           <a:p>
             <a:fld id="{7D2FF18F-DFC6-48DD-A8FE-22636A2E9C75}" type="datetimeFigureOut">
               <a:rPr lang="en-US" smtClean="0"/>
-              <a:t>11/6/2017</a:t>
+              <a:t>11/28/2017</a:t>
             </a:fld>
             <a:endParaRPr lang="en-US"/>
           </a:p>
@@ -2921,7 +2925,7 @@
           <a:p>
             <a:fld id="{7D2FF18F-DFC6-48DD-A8FE-22636A2E9C75}" type="datetimeFigureOut">
               <a:rPr lang="en-US" smtClean="0"/>
-              <a:t>11/6/2017</a:t>
+              <a:t>11/28/2017</a:t>
             </a:fld>
             <a:endParaRPr lang="en-US"/>
           </a:p>
@@ -3134,7 +3138,7 @@
           <a:p>
             <a:fld id="{7D2FF18F-DFC6-48DD-A8FE-22636A2E9C75}" type="datetimeFigureOut">
               <a:rPr lang="en-US" smtClean="0"/>
-              <a:t>11/6/2017</a:t>
+              <a:t>11/28/2017</a:t>
             </a:fld>
             <a:endParaRPr lang="en-US"/>
           </a:p>
@@ -3623,6 +3627,495 @@
           <a:lstStyle/>
           <a:p>
             <a:r>
+              <a:rPr lang="en-US" dirty="0" err="1" smtClean="0"/>
+              <a:t>Samza</a:t>
+            </a:r>
+            <a:r>
+              <a:rPr lang="en-US" dirty="0" smtClean="0"/>
+              <a:t> Container</a:t>
+            </a:r>
+            <a:endParaRPr lang="en-US" dirty="0"/>
+          </a:p>
+        </p:txBody>
+      </p:sp>
+      <p:pic>
+        <p:nvPicPr>
+          <p:cNvPr id="3" name="Picture 2"/>
+          <p:cNvPicPr>
+            <a:picLocks noChangeAspect="1"/>
+          </p:cNvPicPr>
+          <p:nvPr/>
+        </p:nvPicPr>
+        <p:blipFill>
+          <a:blip r:embed="rId2"/>
+          <a:stretch>
+            <a:fillRect/>
+          </a:stretch>
+        </p:blipFill>
+        <p:spPr>
+          <a:xfrm>
+            <a:off x="1914891" y="1847850"/>
+            <a:ext cx="8010525" cy="4533900"/>
+          </a:xfrm>
+          <a:prstGeom prst="rect">
+            <a:avLst/>
+          </a:prstGeom>
+        </p:spPr>
+      </p:pic>
+    </p:spTree>
+    <p:extLst>
+      <p:ext uri="{BB962C8B-B14F-4D97-AF65-F5344CB8AC3E}">
+        <p14:creationId xmlns:p14="http://schemas.microsoft.com/office/powerpoint/2010/main" val="3244104528"/>
+      </p:ext>
+    </p:extLst>
+  </p:cSld>
+  <p:clrMapOvr>
+    <a:masterClrMapping/>
+  </p:clrMapOvr>
+</p:sld>
+</file>
+
+<file path=ppt/slides/slide11.xml><?xml version="1.0" encoding="utf-8"?>
+<p:sld xmlns:a="http://schemas.openxmlformats.org/drawingml/2006/main" xmlns:r="http://schemas.openxmlformats.org/officeDocument/2006/relationships" xmlns:p="http://schemas.openxmlformats.org/presentationml/2006/main">
+  <p:cSld>
+    <p:spTree>
+      <p:nvGrpSpPr>
+        <p:cNvPr id="1" name=""/>
+        <p:cNvGrpSpPr/>
+        <p:nvPr/>
+      </p:nvGrpSpPr>
+      <p:grpSpPr>
+        <a:xfrm>
+          <a:off x="0" y="0"/>
+          <a:ext cx="0" cy="0"/>
+          <a:chOff x="0" y="0"/>
+          <a:chExt cx="0" cy="0"/>
+        </a:xfrm>
+      </p:grpSpPr>
+      <p:sp>
+        <p:nvSpPr>
+          <p:cNvPr id="5" name="Rectangle 4"/>
+          <p:cNvSpPr/>
+          <p:nvPr/>
+        </p:nvSpPr>
+        <p:spPr>
+          <a:xfrm>
+            <a:off x="3540034" y="2508069"/>
+            <a:ext cx="4310743" cy="3213462"/>
+          </a:xfrm>
+          <a:prstGeom prst="rect">
+            <a:avLst/>
+          </a:prstGeom>
+        </p:spPr>
+        <p:style>
+          <a:lnRef idx="2">
+            <a:schemeClr val="accent1"/>
+          </a:lnRef>
+          <a:fillRef idx="1">
+            <a:schemeClr val="lt1"/>
+          </a:fillRef>
+          <a:effectRef idx="0">
+            <a:schemeClr val="accent1"/>
+          </a:effectRef>
+          <a:fontRef idx="minor">
+            <a:schemeClr val="dk1"/>
+          </a:fontRef>
+        </p:style>
+        <p:txBody>
+          <a:bodyPr rtlCol="0" anchor="ctr"/>
+          <a:lstStyle/>
+          <a:p>
+            <a:pPr algn="ctr"/>
+            <a:endParaRPr lang="en-US"/>
+          </a:p>
+        </p:txBody>
+      </p:sp>
+      <p:sp>
+        <p:nvSpPr>
+          <p:cNvPr id="2" name="Title 1"/>
+          <p:cNvSpPr>
+            <a:spLocks noGrp="1"/>
+          </p:cNvSpPr>
+          <p:nvPr>
+            <p:ph type="title"/>
+          </p:nvPr>
+        </p:nvSpPr>
+        <p:spPr/>
+        <p:txBody>
+          <a:bodyPr/>
+          <a:lstStyle/>
+          <a:p>
+            <a:r>
+              <a:rPr lang="en-US" altLang="zh-CN" dirty="0" smtClean="0"/>
+              <a:t>Task</a:t>
+            </a:r>
+            <a:endParaRPr lang="en-US" dirty="0"/>
+          </a:p>
+        </p:txBody>
+      </p:sp>
+      <p:sp>
+        <p:nvSpPr>
+          <p:cNvPr id="4" name="Rectangle 3"/>
+          <p:cNvSpPr/>
+          <p:nvPr/>
+        </p:nvSpPr>
+        <p:spPr>
+          <a:xfrm>
+            <a:off x="4180114" y="3435531"/>
+            <a:ext cx="3030582" cy="1258094"/>
+          </a:xfrm>
+          <a:prstGeom prst="rect">
+            <a:avLst/>
+          </a:prstGeom>
+        </p:spPr>
+        <p:style>
+          <a:lnRef idx="2">
+            <a:schemeClr val="accent1"/>
+          </a:lnRef>
+          <a:fillRef idx="1">
+            <a:schemeClr val="lt1"/>
+          </a:fillRef>
+          <a:effectRef idx="0">
+            <a:schemeClr val="accent1"/>
+          </a:effectRef>
+          <a:fontRef idx="minor">
+            <a:schemeClr val="dk1"/>
+          </a:fontRef>
+        </p:style>
+        <p:txBody>
+          <a:bodyPr rtlCol="0" anchor="ctr"/>
+          <a:lstStyle/>
+          <a:p>
+            <a:pPr algn="ctr"/>
+            <a:endParaRPr lang="en-US" dirty="0"/>
+          </a:p>
+        </p:txBody>
+      </p:sp>
+      <p:cxnSp>
+        <p:nvCxnSpPr>
+          <p:cNvPr id="7" name="Straight Arrow Connector 6"/>
+          <p:cNvCxnSpPr>
+            <a:endCxn id="4" idx="1"/>
+          </p:cNvCxnSpPr>
+          <p:nvPr/>
+        </p:nvCxnSpPr>
+        <p:spPr>
+          <a:xfrm>
+            <a:off x="1149531" y="4064578"/>
+            <a:ext cx="3030583" cy="0"/>
+          </a:xfrm>
+          <a:prstGeom prst="straightConnector1">
+            <a:avLst/>
+          </a:prstGeom>
+          <a:ln>
+            <a:tailEnd type="triangle"/>
+          </a:ln>
+        </p:spPr>
+        <p:style>
+          <a:lnRef idx="1">
+            <a:schemeClr val="accent1"/>
+          </a:lnRef>
+          <a:fillRef idx="0">
+            <a:schemeClr val="accent1"/>
+          </a:fillRef>
+          <a:effectRef idx="0">
+            <a:schemeClr val="accent1"/>
+          </a:effectRef>
+          <a:fontRef idx="minor">
+            <a:schemeClr val="tx1"/>
+          </a:fontRef>
+        </p:style>
+      </p:cxnSp>
+      <p:sp>
+        <p:nvSpPr>
+          <p:cNvPr id="8" name="Rectangle 7"/>
+          <p:cNvSpPr/>
+          <p:nvPr/>
+        </p:nvSpPr>
+        <p:spPr>
+          <a:xfrm>
+            <a:off x="1443445" y="3488797"/>
+            <a:ext cx="1776549" cy="496390"/>
+          </a:xfrm>
+          <a:prstGeom prst="rect">
+            <a:avLst/>
+          </a:prstGeom>
+        </p:spPr>
+        <p:style>
+          <a:lnRef idx="2">
+            <a:schemeClr val="accent1"/>
+          </a:lnRef>
+          <a:fillRef idx="1">
+            <a:schemeClr val="lt1"/>
+          </a:fillRef>
+          <a:effectRef idx="0">
+            <a:schemeClr val="accent1"/>
+          </a:effectRef>
+          <a:fontRef idx="minor">
+            <a:schemeClr val="dk1"/>
+          </a:fontRef>
+        </p:style>
+        <p:txBody>
+          <a:bodyPr rtlCol="0" anchor="ctr"/>
+          <a:lstStyle/>
+          <a:p>
+            <a:pPr algn="ctr"/>
+            <a:r>
+              <a:rPr lang="en-US" altLang="zh-CN" dirty="0" err="1" smtClean="0"/>
+              <a:t>Envolope</a:t>
+            </a:r>
+            <a:endParaRPr lang="en-US" dirty="0"/>
+          </a:p>
+        </p:txBody>
+      </p:sp>
+      <p:cxnSp>
+        <p:nvCxnSpPr>
+          <p:cNvPr id="10" name="Straight Arrow Connector 9"/>
+          <p:cNvCxnSpPr/>
+          <p:nvPr/>
+        </p:nvCxnSpPr>
+        <p:spPr>
+          <a:xfrm>
+            <a:off x="7057208" y="4064578"/>
+            <a:ext cx="2739935" cy="8643"/>
+          </a:xfrm>
+          <a:prstGeom prst="straightConnector1">
+            <a:avLst/>
+          </a:prstGeom>
+          <a:ln>
+            <a:tailEnd type="triangle"/>
+          </a:ln>
+        </p:spPr>
+        <p:style>
+          <a:lnRef idx="1">
+            <a:schemeClr val="accent1"/>
+          </a:lnRef>
+          <a:fillRef idx="0">
+            <a:schemeClr val="accent1"/>
+          </a:fillRef>
+          <a:effectRef idx="0">
+            <a:schemeClr val="accent1"/>
+          </a:effectRef>
+          <a:fontRef idx="minor">
+            <a:schemeClr val="tx1"/>
+          </a:fontRef>
+        </p:style>
+      </p:cxnSp>
+      <p:sp>
+        <p:nvSpPr>
+          <p:cNvPr id="11" name="Rectangle 10"/>
+          <p:cNvSpPr/>
+          <p:nvPr/>
+        </p:nvSpPr>
+        <p:spPr>
+          <a:xfrm>
+            <a:off x="5796640" y="3666668"/>
+            <a:ext cx="1260568" cy="795819"/>
+          </a:xfrm>
+          <a:prstGeom prst="rect">
+            <a:avLst/>
+          </a:prstGeom>
+        </p:spPr>
+        <p:style>
+          <a:lnRef idx="2">
+            <a:schemeClr val="accent1"/>
+          </a:lnRef>
+          <a:fillRef idx="1">
+            <a:schemeClr val="lt1"/>
+          </a:fillRef>
+          <a:effectRef idx="0">
+            <a:schemeClr val="accent1"/>
+          </a:effectRef>
+          <a:fontRef idx="minor">
+            <a:schemeClr val="dk1"/>
+          </a:fontRef>
+        </p:style>
+        <p:txBody>
+          <a:bodyPr rtlCol="0" anchor="ctr"/>
+          <a:lstStyle/>
+          <a:p>
+            <a:pPr algn="ctr"/>
+            <a:endParaRPr lang="en-US"/>
+          </a:p>
+        </p:txBody>
+      </p:sp>
+      <p:sp>
+        <p:nvSpPr>
+          <p:cNvPr id="12" name="TextBox 11"/>
+          <p:cNvSpPr txBox="1"/>
+          <p:nvPr/>
+        </p:nvSpPr>
+        <p:spPr>
+          <a:xfrm>
+            <a:off x="4232366" y="3853543"/>
+            <a:ext cx="1463039" cy="369332"/>
+          </a:xfrm>
+          <a:prstGeom prst="rect">
+            <a:avLst/>
+          </a:prstGeom>
+          <a:noFill/>
+        </p:spPr>
+        <p:txBody>
+          <a:bodyPr wrap="square" rtlCol="0">
+            <a:spAutoFit/>
+          </a:bodyPr>
+          <a:lstStyle/>
+          <a:p>
+            <a:r>
+              <a:rPr lang="en-US" altLang="zh-CN" dirty="0" err="1" smtClean="0"/>
+              <a:t>StreamTask</a:t>
+            </a:r>
+            <a:endParaRPr lang="en-US" dirty="0"/>
+          </a:p>
+        </p:txBody>
+      </p:sp>
+      <p:sp>
+        <p:nvSpPr>
+          <p:cNvPr id="13" name="TextBox 12"/>
+          <p:cNvSpPr txBox="1"/>
+          <p:nvPr/>
+        </p:nvSpPr>
+        <p:spPr>
+          <a:xfrm>
+            <a:off x="5901147" y="3750055"/>
+            <a:ext cx="1208314" cy="646331"/>
+          </a:xfrm>
+          <a:prstGeom prst="rect">
+            <a:avLst/>
+          </a:prstGeom>
+          <a:noFill/>
+        </p:spPr>
+        <p:txBody>
+          <a:bodyPr wrap="square" rtlCol="0">
+            <a:spAutoFit/>
+          </a:bodyPr>
+          <a:lstStyle/>
+          <a:p>
+            <a:r>
+              <a:rPr lang="en-US" dirty="0" smtClean="0"/>
+              <a:t>Output Collector</a:t>
+            </a:r>
+          </a:p>
+        </p:txBody>
+      </p:sp>
+      <p:sp>
+        <p:nvSpPr>
+          <p:cNvPr id="15" name="TextBox 14"/>
+          <p:cNvSpPr txBox="1"/>
+          <p:nvPr/>
+        </p:nvSpPr>
+        <p:spPr>
+          <a:xfrm>
+            <a:off x="4088674" y="2637682"/>
+            <a:ext cx="1606731" cy="369332"/>
+          </a:xfrm>
+          <a:prstGeom prst="rect">
+            <a:avLst/>
+          </a:prstGeom>
+          <a:noFill/>
+        </p:spPr>
+        <p:txBody>
+          <a:bodyPr wrap="square" rtlCol="0">
+            <a:spAutoFit/>
+          </a:bodyPr>
+          <a:lstStyle/>
+          <a:p>
+            <a:r>
+              <a:rPr lang="en-US" dirty="0" err="1" smtClean="0"/>
+              <a:t>SamzaJob</a:t>
+            </a:r>
+            <a:endParaRPr lang="en-US" dirty="0"/>
+          </a:p>
+        </p:txBody>
+      </p:sp>
+      <p:sp>
+        <p:nvSpPr>
+          <p:cNvPr id="16" name="Rectangle 15"/>
+          <p:cNvSpPr/>
+          <p:nvPr/>
+        </p:nvSpPr>
+        <p:spPr>
+          <a:xfrm>
+            <a:off x="7458889" y="3485816"/>
+            <a:ext cx="1776549" cy="496390"/>
+          </a:xfrm>
+          <a:prstGeom prst="rect">
+            <a:avLst/>
+          </a:prstGeom>
+        </p:spPr>
+        <p:style>
+          <a:lnRef idx="2">
+            <a:schemeClr val="accent1"/>
+          </a:lnRef>
+          <a:fillRef idx="1">
+            <a:schemeClr val="lt1"/>
+          </a:fillRef>
+          <a:effectRef idx="0">
+            <a:schemeClr val="accent1"/>
+          </a:effectRef>
+          <a:fontRef idx="minor">
+            <a:schemeClr val="dk1"/>
+          </a:fontRef>
+        </p:style>
+        <p:txBody>
+          <a:bodyPr rtlCol="0" anchor="ctr"/>
+          <a:lstStyle/>
+          <a:p>
+            <a:pPr algn="ctr"/>
+            <a:r>
+              <a:rPr lang="en-US" altLang="zh-CN" dirty="0" err="1" smtClean="0"/>
+              <a:t>Envolope</a:t>
+            </a:r>
+            <a:endParaRPr lang="en-US" dirty="0"/>
+          </a:p>
+        </p:txBody>
+      </p:sp>
+    </p:spTree>
+    <p:extLst>
+      <p:ext uri="{BB962C8B-B14F-4D97-AF65-F5344CB8AC3E}">
+        <p14:creationId xmlns:p14="http://schemas.microsoft.com/office/powerpoint/2010/main" val="2715910777"/>
+      </p:ext>
+    </p:extLst>
+  </p:cSld>
+  <p:clrMapOvr>
+    <a:masterClrMapping/>
+  </p:clrMapOvr>
+</p:sld>
+</file>
+
+<file path=ppt/slides/slide12.xml><?xml version="1.0" encoding="utf-8"?>
+<p:sld xmlns:a="http://schemas.openxmlformats.org/drawingml/2006/main" xmlns:r="http://schemas.openxmlformats.org/officeDocument/2006/relationships" xmlns:p="http://schemas.openxmlformats.org/presentationml/2006/main">
+  <p:cSld>
+    <p:spTree>
+      <p:nvGrpSpPr>
+        <p:cNvPr id="1" name=""/>
+        <p:cNvGrpSpPr/>
+        <p:nvPr/>
+      </p:nvGrpSpPr>
+      <p:grpSpPr>
+        <a:xfrm>
+          <a:off x="0" y="0"/>
+          <a:ext cx="0" cy="0"/>
+          <a:chOff x="0" y="0"/>
+          <a:chExt cx="0" cy="0"/>
+        </a:xfrm>
+      </p:grpSpPr>
+      <p:sp>
+        <p:nvSpPr>
+          <p:cNvPr id="2" name="Title 1"/>
+          <p:cNvSpPr>
+            <a:spLocks noGrp="1"/>
+          </p:cNvSpPr>
+          <p:nvPr>
+            <p:ph type="title"/>
+          </p:nvPr>
+        </p:nvSpPr>
+        <p:spPr/>
+        <p:txBody>
+          <a:bodyPr/>
+          <a:lstStyle/>
+          <a:p>
+            <a:r>
               <a:rPr lang="en-US" dirty="0" smtClean="0"/>
               <a:t>Submit a task</a:t>
             </a:r>
@@ -5209,7 +5702,7 @@
 </p:sld>
 </file>
 
-<file path=ppt/slides/slide11.xml><?xml version="1.0" encoding="utf-8"?>
+<file path=ppt/slides/slide13.xml><?xml version="1.0" encoding="utf-8"?>
 <p:sld xmlns:a="http://schemas.openxmlformats.org/drawingml/2006/main" xmlns:r="http://schemas.openxmlformats.org/officeDocument/2006/relationships" xmlns:p="http://schemas.openxmlformats.org/presentationml/2006/main">
   <p:cSld>
     <p:spTree>
@@ -5848,7 +6341,7 @@
 </p:sld>
 </file>
 
-<file path=ppt/slides/slide12.xml><?xml version="1.0" encoding="utf-8"?>
+<file path=ppt/slides/slide14.xml><?xml version="1.0" encoding="utf-8"?>
 <p:sld xmlns:a="http://schemas.openxmlformats.org/drawingml/2006/main" xmlns:r="http://schemas.openxmlformats.org/officeDocument/2006/relationships" xmlns:p="http://schemas.openxmlformats.org/presentationml/2006/main">
   <p:cSld>
     <p:spTree>
@@ -6063,7 +6556,7 @@
 </p:sld>
 </file>
 
-<file path=ppt/slides/slide13.xml><?xml version="1.0" encoding="utf-8"?>
+<file path=ppt/slides/slide15.xml><?xml version="1.0" encoding="utf-8"?>
 <p:sld xmlns:a="http://schemas.openxmlformats.org/drawingml/2006/main" xmlns:r="http://schemas.openxmlformats.org/officeDocument/2006/relationships" xmlns:p="http://schemas.openxmlformats.org/presentationml/2006/main">
   <p:cSld>
     <p:spTree>
@@ -9997,6 +10490,1868 @@
       </p:grpSpPr>
       <p:sp>
         <p:nvSpPr>
+          <p:cNvPr id="2" name="Title 1"/>
+          <p:cNvSpPr>
+            <a:spLocks noGrp="1"/>
+          </p:cNvSpPr>
+          <p:nvPr>
+            <p:ph type="title"/>
+          </p:nvPr>
+        </p:nvSpPr>
+        <p:spPr>
+          <a:xfrm>
+            <a:off x="169985" y="-127244"/>
+            <a:ext cx="10515600" cy="1325563"/>
+          </a:xfrm>
+        </p:spPr>
+        <p:txBody>
+          <a:bodyPr/>
+          <a:lstStyle/>
+          <a:p>
+            <a:r>
+              <a:rPr lang="en-US" altLang="zh-CN" dirty="0" smtClean="0"/>
+              <a:t>Run a job</a:t>
+            </a:r>
+            <a:endParaRPr lang="en-US" dirty="0"/>
+          </a:p>
+        </p:txBody>
+      </p:sp>
+      <p:sp>
+        <p:nvSpPr>
+          <p:cNvPr id="4" name="Rectangle 3"/>
+          <p:cNvSpPr/>
+          <p:nvPr/>
+        </p:nvSpPr>
+        <p:spPr>
+          <a:xfrm>
+            <a:off x="624250" y="1599408"/>
+            <a:ext cx="1289539" cy="395654"/>
+          </a:xfrm>
+          <a:prstGeom prst="rect">
+            <a:avLst/>
+          </a:prstGeom>
+        </p:spPr>
+        <p:style>
+          <a:lnRef idx="2">
+            <a:schemeClr val="accent1"/>
+          </a:lnRef>
+          <a:fillRef idx="1">
+            <a:schemeClr val="lt1"/>
+          </a:fillRef>
+          <a:effectRef idx="0">
+            <a:schemeClr val="accent1"/>
+          </a:effectRef>
+          <a:fontRef idx="minor">
+            <a:schemeClr val="dk1"/>
+          </a:fontRef>
+        </p:style>
+        <p:txBody>
+          <a:bodyPr rtlCol="0" anchor="ctr"/>
+          <a:lstStyle/>
+          <a:p>
+            <a:pPr algn="ctr"/>
+            <a:endParaRPr lang="en-US"/>
+          </a:p>
+        </p:txBody>
+      </p:sp>
+      <p:sp>
+        <p:nvSpPr>
+          <p:cNvPr id="5" name="TextBox 4"/>
+          <p:cNvSpPr txBox="1"/>
+          <p:nvPr/>
+        </p:nvSpPr>
+        <p:spPr>
+          <a:xfrm>
+            <a:off x="700451" y="1599408"/>
+            <a:ext cx="1213338" cy="378070"/>
+          </a:xfrm>
+          <a:prstGeom prst="rect">
+            <a:avLst/>
+          </a:prstGeom>
+          <a:noFill/>
+        </p:spPr>
+        <p:txBody>
+          <a:bodyPr wrap="square" rtlCol="0">
+            <a:spAutoFit/>
+          </a:bodyPr>
+          <a:lstStyle/>
+          <a:p>
+            <a:r>
+              <a:rPr lang="en-US" altLang="zh-CN" dirty="0" smtClean="0"/>
+              <a:t>run-job.sh</a:t>
+            </a:r>
+            <a:endParaRPr lang="en-US" dirty="0"/>
+          </a:p>
+        </p:txBody>
+      </p:sp>
+      <p:cxnSp>
+        <p:nvCxnSpPr>
+          <p:cNvPr id="6" name="Straight Arrow Connector 5"/>
+          <p:cNvCxnSpPr>
+            <a:stCxn id="5" idx="3"/>
+            <a:endCxn id="7" idx="1"/>
+          </p:cNvCxnSpPr>
+          <p:nvPr/>
+        </p:nvCxnSpPr>
+        <p:spPr>
+          <a:xfrm>
+            <a:off x="1913789" y="1788443"/>
+            <a:ext cx="1434438" cy="7715"/>
+          </a:xfrm>
+          <a:prstGeom prst="straightConnector1">
+            <a:avLst/>
+          </a:prstGeom>
+          <a:ln>
+            <a:tailEnd type="triangle"/>
+          </a:ln>
+        </p:spPr>
+        <p:style>
+          <a:lnRef idx="1">
+            <a:schemeClr val="accent1"/>
+          </a:lnRef>
+          <a:fillRef idx="0">
+            <a:schemeClr val="accent1"/>
+          </a:fillRef>
+          <a:effectRef idx="0">
+            <a:schemeClr val="accent1"/>
+          </a:effectRef>
+          <a:fontRef idx="minor">
+            <a:schemeClr val="tx1"/>
+          </a:fontRef>
+        </p:style>
+      </p:cxnSp>
+      <p:sp>
+        <p:nvSpPr>
+          <p:cNvPr id="7" name="Rectangle 6"/>
+          <p:cNvSpPr/>
+          <p:nvPr/>
+        </p:nvSpPr>
+        <p:spPr>
+          <a:xfrm>
+            <a:off x="3348227" y="1553087"/>
+            <a:ext cx="1345222" cy="486142"/>
+          </a:xfrm>
+          <a:prstGeom prst="rect">
+            <a:avLst/>
+          </a:prstGeom>
+        </p:spPr>
+        <p:style>
+          <a:lnRef idx="2">
+            <a:schemeClr val="accent1"/>
+          </a:lnRef>
+          <a:fillRef idx="1">
+            <a:schemeClr val="lt1"/>
+          </a:fillRef>
+          <a:effectRef idx="0">
+            <a:schemeClr val="accent1"/>
+          </a:effectRef>
+          <a:fontRef idx="minor">
+            <a:schemeClr val="dk1"/>
+          </a:fontRef>
+        </p:style>
+        <p:txBody>
+          <a:bodyPr rtlCol="0" anchor="ctr"/>
+          <a:lstStyle/>
+          <a:p>
+            <a:pPr algn="ctr"/>
+            <a:endParaRPr lang="en-US"/>
+          </a:p>
+        </p:txBody>
+      </p:sp>
+      <p:sp>
+        <p:nvSpPr>
+          <p:cNvPr id="8" name="TextBox 7"/>
+          <p:cNvSpPr txBox="1"/>
+          <p:nvPr/>
+        </p:nvSpPr>
+        <p:spPr>
+          <a:xfrm>
+            <a:off x="3453734" y="1643574"/>
+            <a:ext cx="1239715" cy="369332"/>
+          </a:xfrm>
+          <a:prstGeom prst="rect">
+            <a:avLst/>
+          </a:prstGeom>
+          <a:noFill/>
+        </p:spPr>
+        <p:txBody>
+          <a:bodyPr wrap="square" rtlCol="0">
+            <a:spAutoFit/>
+          </a:bodyPr>
+          <a:lstStyle/>
+          <a:p>
+            <a:r>
+              <a:rPr lang="en-US" altLang="zh-CN" dirty="0" err="1" smtClean="0"/>
+              <a:t>JobRunner</a:t>
+            </a:r>
+            <a:endParaRPr lang="en-US" dirty="0"/>
+          </a:p>
+        </p:txBody>
+      </p:sp>
+      <p:cxnSp>
+        <p:nvCxnSpPr>
+          <p:cNvPr id="9" name="Straight Arrow Connector 8"/>
+          <p:cNvCxnSpPr>
+            <a:stCxn id="7" idx="3"/>
+            <a:endCxn id="10" idx="1"/>
+          </p:cNvCxnSpPr>
+          <p:nvPr/>
+        </p:nvCxnSpPr>
+        <p:spPr>
+          <a:xfrm flipV="1">
+            <a:off x="4693449" y="1772945"/>
+            <a:ext cx="1138326" cy="23213"/>
+          </a:xfrm>
+          <a:prstGeom prst="straightConnector1">
+            <a:avLst/>
+          </a:prstGeom>
+          <a:ln>
+            <a:tailEnd type="triangle"/>
+          </a:ln>
+        </p:spPr>
+        <p:style>
+          <a:lnRef idx="1">
+            <a:schemeClr val="accent1"/>
+          </a:lnRef>
+          <a:fillRef idx="0">
+            <a:schemeClr val="accent1"/>
+          </a:fillRef>
+          <a:effectRef idx="0">
+            <a:schemeClr val="accent1"/>
+          </a:effectRef>
+          <a:fontRef idx="minor">
+            <a:schemeClr val="tx1"/>
+          </a:fontRef>
+        </p:style>
+      </p:cxnSp>
+      <p:sp>
+        <p:nvSpPr>
+          <p:cNvPr id="10" name="Rectangle 9"/>
+          <p:cNvSpPr/>
+          <p:nvPr/>
+        </p:nvSpPr>
+        <p:spPr>
+          <a:xfrm>
+            <a:off x="5831775" y="1527313"/>
+            <a:ext cx="1354012" cy="491263"/>
+          </a:xfrm>
+          <a:prstGeom prst="rect">
+            <a:avLst/>
+          </a:prstGeom>
+        </p:spPr>
+        <p:style>
+          <a:lnRef idx="2">
+            <a:schemeClr val="accent1"/>
+          </a:lnRef>
+          <a:fillRef idx="1">
+            <a:schemeClr val="lt1"/>
+          </a:fillRef>
+          <a:effectRef idx="0">
+            <a:schemeClr val="accent1"/>
+          </a:effectRef>
+          <a:fontRef idx="minor">
+            <a:schemeClr val="dk1"/>
+          </a:fontRef>
+        </p:style>
+        <p:txBody>
+          <a:bodyPr rtlCol="0" anchor="ctr"/>
+          <a:lstStyle/>
+          <a:p>
+            <a:pPr algn="ctr"/>
+            <a:endParaRPr lang="en-US"/>
+          </a:p>
+        </p:txBody>
+      </p:sp>
+      <p:sp>
+        <p:nvSpPr>
+          <p:cNvPr id="11" name="TextBox 10"/>
+          <p:cNvSpPr txBox="1"/>
+          <p:nvPr/>
+        </p:nvSpPr>
+        <p:spPr>
+          <a:xfrm>
+            <a:off x="6074296" y="1587014"/>
+            <a:ext cx="1090246" cy="369332"/>
+          </a:xfrm>
+          <a:prstGeom prst="rect">
+            <a:avLst/>
+          </a:prstGeom>
+          <a:noFill/>
+        </p:spPr>
+        <p:txBody>
+          <a:bodyPr wrap="square" rtlCol="0">
+            <a:spAutoFit/>
+          </a:bodyPr>
+          <a:lstStyle/>
+          <a:p>
+            <a:r>
+              <a:rPr lang="en-US" dirty="0" err="1" smtClean="0"/>
+              <a:t>YarnJob</a:t>
+            </a:r>
+            <a:endParaRPr lang="en-US" dirty="0"/>
+          </a:p>
+        </p:txBody>
+      </p:sp>
+      <p:cxnSp>
+        <p:nvCxnSpPr>
+          <p:cNvPr id="12" name="Straight Arrow Connector 11"/>
+          <p:cNvCxnSpPr>
+            <a:stCxn id="13" idx="2"/>
+            <a:endCxn id="5" idx="0"/>
+          </p:cNvCxnSpPr>
+          <p:nvPr/>
+        </p:nvCxnSpPr>
+        <p:spPr>
+          <a:xfrm>
+            <a:off x="1307120" y="1433561"/>
+            <a:ext cx="0" cy="165847"/>
+          </a:xfrm>
+          <a:prstGeom prst="straightConnector1">
+            <a:avLst/>
+          </a:prstGeom>
+          <a:ln>
+            <a:tailEnd type="triangle"/>
+          </a:ln>
+        </p:spPr>
+        <p:style>
+          <a:lnRef idx="1">
+            <a:schemeClr val="accent1"/>
+          </a:lnRef>
+          <a:fillRef idx="0">
+            <a:schemeClr val="accent1"/>
+          </a:fillRef>
+          <a:effectRef idx="0">
+            <a:schemeClr val="accent1"/>
+          </a:effectRef>
+          <a:fontRef idx="minor">
+            <a:schemeClr val="tx1"/>
+          </a:fontRef>
+        </p:style>
+      </p:cxnSp>
+      <p:sp>
+        <p:nvSpPr>
+          <p:cNvPr id="13" name="TextBox 12"/>
+          <p:cNvSpPr txBox="1"/>
+          <p:nvPr/>
+        </p:nvSpPr>
+        <p:spPr>
+          <a:xfrm>
+            <a:off x="385943" y="787230"/>
+            <a:ext cx="1842354" cy="646331"/>
+          </a:xfrm>
+          <a:prstGeom prst="rect">
+            <a:avLst/>
+          </a:prstGeom>
+          <a:noFill/>
+        </p:spPr>
+        <p:txBody>
+          <a:bodyPr wrap="square" rtlCol="0">
+            <a:spAutoFit/>
+          </a:bodyPr>
+          <a:lstStyle/>
+          <a:p>
+            <a:r>
+              <a:rPr lang="en-US" dirty="0" smtClean="0"/>
+              <a:t>submit configuration file</a:t>
+            </a:r>
+            <a:endParaRPr lang="en-US" dirty="0"/>
+          </a:p>
+        </p:txBody>
+      </p:sp>
+      <p:cxnSp>
+        <p:nvCxnSpPr>
+          <p:cNvPr id="14" name="Straight Arrow Connector 13"/>
+          <p:cNvCxnSpPr>
+            <a:stCxn id="10" idx="3"/>
+            <a:endCxn id="51" idx="1"/>
+          </p:cNvCxnSpPr>
+          <p:nvPr/>
+        </p:nvCxnSpPr>
+        <p:spPr>
+          <a:xfrm>
+            <a:off x="7185787" y="1772945"/>
+            <a:ext cx="864981" cy="0"/>
+          </a:xfrm>
+          <a:prstGeom prst="straightConnector1">
+            <a:avLst/>
+          </a:prstGeom>
+          <a:ln>
+            <a:tailEnd type="triangle"/>
+          </a:ln>
+        </p:spPr>
+        <p:style>
+          <a:lnRef idx="1">
+            <a:schemeClr val="accent1"/>
+          </a:lnRef>
+          <a:fillRef idx="0">
+            <a:schemeClr val="accent1"/>
+          </a:fillRef>
+          <a:effectRef idx="0">
+            <a:schemeClr val="accent1"/>
+          </a:effectRef>
+          <a:fontRef idx="minor">
+            <a:schemeClr val="tx1"/>
+          </a:fontRef>
+        </p:style>
+      </p:cxnSp>
+      <p:sp>
+        <p:nvSpPr>
+          <p:cNvPr id="15" name="Rectangle 14"/>
+          <p:cNvSpPr/>
+          <p:nvPr/>
+        </p:nvSpPr>
+        <p:spPr>
+          <a:xfrm>
+            <a:off x="10089174" y="1513744"/>
+            <a:ext cx="1380392" cy="491264"/>
+          </a:xfrm>
+          <a:prstGeom prst="rect">
+            <a:avLst/>
+          </a:prstGeom>
+        </p:spPr>
+        <p:style>
+          <a:lnRef idx="2">
+            <a:schemeClr val="accent1"/>
+          </a:lnRef>
+          <a:fillRef idx="1">
+            <a:schemeClr val="lt1"/>
+          </a:fillRef>
+          <a:effectRef idx="0">
+            <a:schemeClr val="accent1"/>
+          </a:effectRef>
+          <a:fontRef idx="minor">
+            <a:schemeClr val="dk1"/>
+          </a:fontRef>
+        </p:style>
+        <p:txBody>
+          <a:bodyPr rtlCol="0" anchor="ctr"/>
+          <a:lstStyle/>
+          <a:p>
+            <a:pPr algn="ctr"/>
+            <a:endParaRPr lang="en-US"/>
+          </a:p>
+        </p:txBody>
+      </p:sp>
+      <p:sp>
+        <p:nvSpPr>
+          <p:cNvPr id="16" name="TextBox 15"/>
+          <p:cNvSpPr txBox="1"/>
+          <p:nvPr/>
+        </p:nvSpPr>
+        <p:spPr>
+          <a:xfrm>
+            <a:off x="10265019" y="1596192"/>
+            <a:ext cx="1204546" cy="369332"/>
+          </a:xfrm>
+          <a:prstGeom prst="rect">
+            <a:avLst/>
+          </a:prstGeom>
+          <a:noFill/>
+        </p:spPr>
+        <p:txBody>
+          <a:bodyPr wrap="square" rtlCol="0">
+            <a:spAutoFit/>
+          </a:bodyPr>
+          <a:lstStyle/>
+          <a:p>
+            <a:r>
+              <a:rPr lang="en-US" dirty="0" smtClean="0"/>
+              <a:t>run-jc.sh</a:t>
+            </a:r>
+            <a:endParaRPr lang="en-US" dirty="0"/>
+          </a:p>
+        </p:txBody>
+      </p:sp>
+      <p:cxnSp>
+        <p:nvCxnSpPr>
+          <p:cNvPr id="17" name="Straight Arrow Connector 16"/>
+          <p:cNvCxnSpPr>
+            <a:stCxn id="15" idx="2"/>
+            <a:endCxn id="18" idx="0"/>
+          </p:cNvCxnSpPr>
+          <p:nvPr/>
+        </p:nvCxnSpPr>
+        <p:spPr>
+          <a:xfrm>
+            <a:off x="10779370" y="2005008"/>
+            <a:ext cx="0" cy="1641715"/>
+          </a:xfrm>
+          <a:prstGeom prst="straightConnector1">
+            <a:avLst/>
+          </a:prstGeom>
+          <a:ln>
+            <a:tailEnd type="triangle"/>
+          </a:ln>
+        </p:spPr>
+        <p:style>
+          <a:lnRef idx="1">
+            <a:schemeClr val="accent1"/>
+          </a:lnRef>
+          <a:fillRef idx="0">
+            <a:schemeClr val="accent1"/>
+          </a:fillRef>
+          <a:effectRef idx="0">
+            <a:schemeClr val="accent1"/>
+          </a:effectRef>
+          <a:fontRef idx="minor">
+            <a:schemeClr val="tx1"/>
+          </a:fontRef>
+        </p:style>
+      </p:cxnSp>
+      <p:sp>
+        <p:nvSpPr>
+          <p:cNvPr id="18" name="Rectangle 17"/>
+          <p:cNvSpPr/>
+          <p:nvPr/>
+        </p:nvSpPr>
+        <p:spPr>
+          <a:xfrm>
+            <a:off x="9782176" y="3646723"/>
+            <a:ext cx="1994388" cy="856396"/>
+          </a:xfrm>
+          <a:prstGeom prst="rect">
+            <a:avLst/>
+          </a:prstGeom>
+        </p:spPr>
+        <p:style>
+          <a:lnRef idx="2">
+            <a:schemeClr val="accent1"/>
+          </a:lnRef>
+          <a:fillRef idx="1">
+            <a:schemeClr val="lt1"/>
+          </a:fillRef>
+          <a:effectRef idx="0">
+            <a:schemeClr val="accent1"/>
+          </a:effectRef>
+          <a:fontRef idx="minor">
+            <a:schemeClr val="dk1"/>
+          </a:fontRef>
+        </p:style>
+        <p:txBody>
+          <a:bodyPr rtlCol="0" anchor="ctr"/>
+          <a:lstStyle/>
+          <a:p>
+            <a:pPr algn="ctr"/>
+            <a:endParaRPr lang="en-US"/>
+          </a:p>
+        </p:txBody>
+      </p:sp>
+      <p:sp>
+        <p:nvSpPr>
+          <p:cNvPr id="19" name="TextBox 18"/>
+          <p:cNvSpPr txBox="1"/>
+          <p:nvPr/>
+        </p:nvSpPr>
+        <p:spPr>
+          <a:xfrm>
+            <a:off x="9912595" y="3772967"/>
+            <a:ext cx="1723292" cy="646331"/>
+          </a:xfrm>
+          <a:prstGeom prst="rect">
+            <a:avLst/>
+          </a:prstGeom>
+          <a:noFill/>
+        </p:spPr>
+        <p:txBody>
+          <a:bodyPr wrap="square" rtlCol="0">
+            <a:spAutoFit/>
+          </a:bodyPr>
+          <a:lstStyle/>
+          <a:p>
+            <a:r>
+              <a:rPr lang="en-US" dirty="0" err="1" smtClean="0"/>
+              <a:t>Cluster</a:t>
+            </a:r>
+            <a:r>
+              <a:rPr lang="en-US" altLang="zh-CN" dirty="0" err="1" smtClean="0"/>
+              <a:t>BasedJobCoordinator</a:t>
+            </a:r>
+            <a:endParaRPr lang="en-US" dirty="0"/>
+          </a:p>
+        </p:txBody>
+      </p:sp>
+      <p:sp>
+        <p:nvSpPr>
+          <p:cNvPr id="20" name="TextBox 19"/>
+          <p:cNvSpPr txBox="1"/>
+          <p:nvPr/>
+        </p:nvSpPr>
+        <p:spPr>
+          <a:xfrm>
+            <a:off x="10085507" y="4478160"/>
+            <a:ext cx="1635369" cy="646331"/>
+          </a:xfrm>
+          <a:prstGeom prst="rect">
+            <a:avLst/>
+          </a:prstGeom>
+          <a:noFill/>
+        </p:spPr>
+        <p:txBody>
+          <a:bodyPr wrap="square" rtlCol="0">
+            <a:spAutoFit/>
+          </a:bodyPr>
+          <a:lstStyle/>
+          <a:p>
+            <a:r>
+              <a:rPr lang="en-US" dirty="0" smtClean="0"/>
+              <a:t>Is not normal </a:t>
+            </a:r>
+            <a:r>
+              <a:rPr lang="en-US" dirty="0" err="1" smtClean="0"/>
+              <a:t>JobCoordinator</a:t>
+            </a:r>
+            <a:endParaRPr lang="en-US" dirty="0"/>
+          </a:p>
+        </p:txBody>
+      </p:sp>
+      <p:cxnSp>
+        <p:nvCxnSpPr>
+          <p:cNvPr id="21" name="Straight Arrow Connector 20"/>
+          <p:cNvCxnSpPr>
+            <a:stCxn id="18" idx="1"/>
+            <a:endCxn id="22" idx="3"/>
+          </p:cNvCxnSpPr>
+          <p:nvPr/>
+        </p:nvCxnSpPr>
+        <p:spPr>
+          <a:xfrm flipH="1">
+            <a:off x="8950381" y="4074921"/>
+            <a:ext cx="831795" cy="22317"/>
+          </a:xfrm>
+          <a:prstGeom prst="straightConnector1">
+            <a:avLst/>
+          </a:prstGeom>
+          <a:ln>
+            <a:tailEnd type="triangle"/>
+          </a:ln>
+        </p:spPr>
+        <p:style>
+          <a:lnRef idx="1">
+            <a:schemeClr val="accent1"/>
+          </a:lnRef>
+          <a:fillRef idx="0">
+            <a:schemeClr val="accent1"/>
+          </a:fillRef>
+          <a:effectRef idx="0">
+            <a:schemeClr val="accent1"/>
+          </a:effectRef>
+          <a:fontRef idx="minor">
+            <a:schemeClr val="tx1"/>
+          </a:fontRef>
+        </p:style>
+      </p:cxnSp>
+      <p:sp>
+        <p:nvSpPr>
+          <p:cNvPr id="22" name="Rectangle 21"/>
+          <p:cNvSpPr/>
+          <p:nvPr/>
+        </p:nvSpPr>
+        <p:spPr>
+          <a:xfrm>
+            <a:off x="7110586" y="3639824"/>
+            <a:ext cx="1839795" cy="914828"/>
+          </a:xfrm>
+          <a:prstGeom prst="rect">
+            <a:avLst/>
+          </a:prstGeom>
+        </p:spPr>
+        <p:style>
+          <a:lnRef idx="2">
+            <a:schemeClr val="accent1"/>
+          </a:lnRef>
+          <a:fillRef idx="1">
+            <a:schemeClr val="lt1"/>
+          </a:fillRef>
+          <a:effectRef idx="0">
+            <a:schemeClr val="accent1"/>
+          </a:effectRef>
+          <a:fontRef idx="minor">
+            <a:schemeClr val="dk1"/>
+          </a:fontRef>
+        </p:style>
+        <p:txBody>
+          <a:bodyPr rtlCol="0" anchor="ctr"/>
+          <a:lstStyle/>
+          <a:p>
+            <a:pPr algn="ctr"/>
+            <a:endParaRPr lang="en-US"/>
+          </a:p>
+        </p:txBody>
+      </p:sp>
+      <p:sp>
+        <p:nvSpPr>
+          <p:cNvPr id="23" name="TextBox 22"/>
+          <p:cNvSpPr txBox="1"/>
+          <p:nvPr/>
+        </p:nvSpPr>
+        <p:spPr>
+          <a:xfrm>
+            <a:off x="7110587" y="3782077"/>
+            <a:ext cx="1981210" cy="646331"/>
+          </a:xfrm>
+          <a:prstGeom prst="rect">
+            <a:avLst/>
+          </a:prstGeom>
+          <a:noFill/>
+        </p:spPr>
+        <p:txBody>
+          <a:bodyPr wrap="square" rtlCol="0">
+            <a:spAutoFit/>
+          </a:bodyPr>
+          <a:lstStyle/>
+          <a:p>
+            <a:r>
+              <a:rPr lang="en-US" altLang="zh-CN" dirty="0" err="1" smtClean="0"/>
+              <a:t>ContainerProcessManager</a:t>
+            </a:r>
+            <a:endParaRPr lang="en-US" dirty="0"/>
+          </a:p>
+        </p:txBody>
+      </p:sp>
+      <p:sp>
+        <p:nvSpPr>
+          <p:cNvPr id="24" name="TextBox 23"/>
+          <p:cNvSpPr txBox="1"/>
+          <p:nvPr/>
+        </p:nvSpPr>
+        <p:spPr>
+          <a:xfrm>
+            <a:off x="7059303" y="2975216"/>
+            <a:ext cx="2083777" cy="646331"/>
+          </a:xfrm>
+          <a:prstGeom prst="rect">
+            <a:avLst/>
+          </a:prstGeom>
+          <a:noFill/>
+        </p:spPr>
+        <p:txBody>
+          <a:bodyPr wrap="square" rtlCol="0">
+            <a:spAutoFit/>
+          </a:bodyPr>
+          <a:lstStyle/>
+          <a:p>
+            <a:r>
+              <a:rPr lang="en-US" dirty="0" smtClean="0"/>
+              <a:t>Request containers, handle failures</a:t>
+            </a:r>
+            <a:endParaRPr lang="en-US" dirty="0"/>
+          </a:p>
+        </p:txBody>
+      </p:sp>
+      <p:sp>
+        <p:nvSpPr>
+          <p:cNvPr id="25" name="TextBox 24"/>
+          <p:cNvSpPr txBox="1"/>
+          <p:nvPr/>
+        </p:nvSpPr>
+        <p:spPr>
+          <a:xfrm>
+            <a:off x="2352354" y="1724944"/>
+            <a:ext cx="832626" cy="369332"/>
+          </a:xfrm>
+          <a:prstGeom prst="rect">
+            <a:avLst/>
+          </a:prstGeom>
+          <a:noFill/>
+        </p:spPr>
+        <p:txBody>
+          <a:bodyPr wrap="square" rtlCol="0">
+            <a:spAutoFit/>
+          </a:bodyPr>
+          <a:lstStyle/>
+          <a:p>
+            <a:r>
+              <a:rPr lang="en-US" dirty="0" smtClean="0"/>
+              <a:t>call</a:t>
+            </a:r>
+            <a:endParaRPr lang="en-US" dirty="0"/>
+          </a:p>
+        </p:txBody>
+      </p:sp>
+      <p:sp>
+        <p:nvSpPr>
+          <p:cNvPr id="26" name="TextBox 25"/>
+          <p:cNvSpPr txBox="1"/>
+          <p:nvPr/>
+        </p:nvSpPr>
+        <p:spPr>
+          <a:xfrm>
+            <a:off x="4937023" y="1724944"/>
+            <a:ext cx="826332" cy="369332"/>
+          </a:xfrm>
+          <a:prstGeom prst="rect">
+            <a:avLst/>
+          </a:prstGeom>
+          <a:noFill/>
+        </p:spPr>
+        <p:txBody>
+          <a:bodyPr wrap="square" rtlCol="0">
+            <a:spAutoFit/>
+          </a:bodyPr>
+          <a:lstStyle/>
+          <a:p>
+            <a:r>
+              <a:rPr lang="en-US" dirty="0" smtClean="0"/>
+              <a:t>new</a:t>
+            </a:r>
+            <a:endParaRPr lang="en-US" dirty="0"/>
+          </a:p>
+        </p:txBody>
+      </p:sp>
+      <p:sp>
+        <p:nvSpPr>
+          <p:cNvPr id="27" name="TextBox 26"/>
+          <p:cNvSpPr txBox="1"/>
+          <p:nvPr/>
+        </p:nvSpPr>
+        <p:spPr>
+          <a:xfrm>
+            <a:off x="6947564" y="1938844"/>
+            <a:ext cx="1893642" cy="646331"/>
+          </a:xfrm>
+          <a:prstGeom prst="rect">
+            <a:avLst/>
+          </a:prstGeom>
+          <a:noFill/>
+        </p:spPr>
+        <p:txBody>
+          <a:bodyPr wrap="square" rtlCol="0">
+            <a:spAutoFit/>
+          </a:bodyPr>
+          <a:lstStyle/>
+          <a:p>
+            <a:r>
+              <a:rPr lang="en-US" dirty="0" smtClean="0"/>
+              <a:t>pass </a:t>
+            </a:r>
+            <a:r>
+              <a:rPr lang="en-US" dirty="0" err="1" smtClean="0"/>
+              <a:t>cmds</a:t>
+            </a:r>
+            <a:r>
+              <a:rPr lang="en-US" dirty="0" smtClean="0"/>
+              <a:t> as a parameter</a:t>
+            </a:r>
+            <a:endParaRPr lang="en-US" dirty="0"/>
+          </a:p>
+        </p:txBody>
+      </p:sp>
+      <p:cxnSp>
+        <p:nvCxnSpPr>
+          <p:cNvPr id="28" name="Straight Arrow Connector 27"/>
+          <p:cNvCxnSpPr>
+            <a:stCxn id="23" idx="1"/>
+            <a:endCxn id="35" idx="3"/>
+          </p:cNvCxnSpPr>
+          <p:nvPr/>
+        </p:nvCxnSpPr>
+        <p:spPr>
+          <a:xfrm flipH="1" flipV="1">
+            <a:off x="6158721" y="4095191"/>
+            <a:ext cx="951866" cy="10052"/>
+          </a:xfrm>
+          <a:prstGeom prst="straightConnector1">
+            <a:avLst/>
+          </a:prstGeom>
+          <a:ln>
+            <a:tailEnd type="triangle"/>
+          </a:ln>
+        </p:spPr>
+        <p:style>
+          <a:lnRef idx="1">
+            <a:schemeClr val="accent1"/>
+          </a:lnRef>
+          <a:fillRef idx="0">
+            <a:schemeClr val="accent1"/>
+          </a:fillRef>
+          <a:effectRef idx="0">
+            <a:schemeClr val="accent1"/>
+          </a:effectRef>
+          <a:fontRef idx="minor">
+            <a:schemeClr val="tx1"/>
+          </a:fontRef>
+        </p:style>
+      </p:cxnSp>
+      <p:sp>
+        <p:nvSpPr>
+          <p:cNvPr id="29" name="Rectangle 28"/>
+          <p:cNvSpPr/>
+          <p:nvPr/>
+        </p:nvSpPr>
+        <p:spPr>
+          <a:xfrm>
+            <a:off x="528815" y="3633116"/>
+            <a:ext cx="1839795" cy="914828"/>
+          </a:xfrm>
+          <a:prstGeom prst="rect">
+            <a:avLst/>
+          </a:prstGeom>
+        </p:spPr>
+        <p:style>
+          <a:lnRef idx="2">
+            <a:schemeClr val="accent1"/>
+          </a:lnRef>
+          <a:fillRef idx="1">
+            <a:schemeClr val="lt1"/>
+          </a:fillRef>
+          <a:effectRef idx="0">
+            <a:schemeClr val="accent1"/>
+          </a:effectRef>
+          <a:fontRef idx="minor">
+            <a:schemeClr val="dk1"/>
+          </a:fontRef>
+        </p:style>
+        <p:txBody>
+          <a:bodyPr rtlCol="0" anchor="ctr"/>
+          <a:lstStyle/>
+          <a:p>
+            <a:pPr algn="ctr"/>
+            <a:endParaRPr lang="en-US"/>
+          </a:p>
+        </p:txBody>
+      </p:sp>
+      <p:sp>
+        <p:nvSpPr>
+          <p:cNvPr id="30" name="TextBox 29"/>
+          <p:cNvSpPr txBox="1"/>
+          <p:nvPr/>
+        </p:nvSpPr>
+        <p:spPr>
+          <a:xfrm>
+            <a:off x="10418885" y="2168955"/>
+            <a:ext cx="360485" cy="370056"/>
+          </a:xfrm>
+          <a:prstGeom prst="rect">
+            <a:avLst/>
+          </a:prstGeom>
+          <a:noFill/>
+        </p:spPr>
+        <p:txBody>
+          <a:bodyPr wrap="square" rtlCol="0">
+            <a:spAutoFit/>
+          </a:bodyPr>
+          <a:lstStyle/>
+          <a:p>
+            <a:endParaRPr lang="en-US" dirty="0"/>
+          </a:p>
+        </p:txBody>
+      </p:sp>
+      <p:sp>
+        <p:nvSpPr>
+          <p:cNvPr id="31" name="TextBox 30"/>
+          <p:cNvSpPr txBox="1"/>
+          <p:nvPr/>
+        </p:nvSpPr>
+        <p:spPr>
+          <a:xfrm>
+            <a:off x="10441526" y="2733932"/>
+            <a:ext cx="461665" cy="464348"/>
+          </a:xfrm>
+          <a:prstGeom prst="rect">
+            <a:avLst/>
+          </a:prstGeom>
+          <a:noFill/>
+        </p:spPr>
+        <p:txBody>
+          <a:bodyPr vert="eaVert" wrap="square" rtlCol="0">
+            <a:spAutoFit/>
+          </a:bodyPr>
+          <a:lstStyle/>
+          <a:p>
+            <a:r>
+              <a:rPr lang="en-US" dirty="0" smtClean="0"/>
+              <a:t>call</a:t>
+            </a:r>
+            <a:endParaRPr lang="en-US" dirty="0"/>
+          </a:p>
+        </p:txBody>
+      </p:sp>
+      <p:sp>
+        <p:nvSpPr>
+          <p:cNvPr id="32" name="TextBox 31"/>
+          <p:cNvSpPr txBox="1"/>
+          <p:nvPr/>
+        </p:nvSpPr>
+        <p:spPr>
+          <a:xfrm>
+            <a:off x="8964853" y="3991032"/>
+            <a:ext cx="1283677" cy="369332"/>
+          </a:xfrm>
+          <a:prstGeom prst="rect">
+            <a:avLst/>
+          </a:prstGeom>
+          <a:noFill/>
+        </p:spPr>
+        <p:txBody>
+          <a:bodyPr wrap="square" rtlCol="0">
+            <a:spAutoFit/>
+          </a:bodyPr>
+          <a:lstStyle/>
+          <a:p>
+            <a:r>
+              <a:rPr lang="en-US" dirty="0" smtClean="0"/>
+              <a:t>contain</a:t>
+            </a:r>
+            <a:endParaRPr lang="en-US" dirty="0"/>
+          </a:p>
+        </p:txBody>
+      </p:sp>
+      <p:sp>
+        <p:nvSpPr>
+          <p:cNvPr id="33" name="TextBox 32"/>
+          <p:cNvSpPr txBox="1"/>
+          <p:nvPr/>
+        </p:nvSpPr>
+        <p:spPr>
+          <a:xfrm>
+            <a:off x="634322" y="3759360"/>
+            <a:ext cx="1628220" cy="646331"/>
+          </a:xfrm>
+          <a:prstGeom prst="rect">
+            <a:avLst/>
+          </a:prstGeom>
+          <a:noFill/>
+        </p:spPr>
+        <p:txBody>
+          <a:bodyPr wrap="square" rtlCol="0">
+            <a:spAutoFit/>
+          </a:bodyPr>
+          <a:lstStyle/>
+          <a:p>
+            <a:r>
+              <a:rPr lang="en-US" dirty="0" err="1" smtClean="0"/>
+              <a:t>YarnClusterResourceManager</a:t>
+            </a:r>
+            <a:endParaRPr lang="en-US" dirty="0"/>
+          </a:p>
+        </p:txBody>
+      </p:sp>
+      <p:sp>
+        <p:nvSpPr>
+          <p:cNvPr id="34" name="TextBox 33"/>
+          <p:cNvSpPr txBox="1"/>
+          <p:nvPr/>
+        </p:nvSpPr>
+        <p:spPr>
+          <a:xfrm>
+            <a:off x="4369465" y="2508225"/>
+            <a:ext cx="2149741" cy="1236554"/>
+          </a:xfrm>
+          <a:prstGeom prst="rect">
+            <a:avLst/>
+          </a:prstGeom>
+          <a:noFill/>
+        </p:spPr>
+        <p:txBody>
+          <a:bodyPr wrap="square" rtlCol="0">
+            <a:spAutoFit/>
+          </a:bodyPr>
+          <a:lstStyle/>
+          <a:p>
+            <a:r>
+              <a:rPr lang="en-US" dirty="0" smtClean="0"/>
+              <a:t>Make requests for physical resources,</a:t>
+            </a:r>
+          </a:p>
+          <a:p>
+            <a:r>
+              <a:rPr lang="en-US" dirty="0" smtClean="0"/>
+              <a:t>run a container on resources</a:t>
+            </a:r>
+            <a:endParaRPr lang="en-US" dirty="0"/>
+          </a:p>
+        </p:txBody>
+      </p:sp>
+      <p:sp>
+        <p:nvSpPr>
+          <p:cNvPr id="35" name="Rectangle 34"/>
+          <p:cNvSpPr/>
+          <p:nvPr/>
+        </p:nvSpPr>
+        <p:spPr>
+          <a:xfrm>
+            <a:off x="4318926" y="3637777"/>
+            <a:ext cx="1839795" cy="914828"/>
+          </a:xfrm>
+          <a:prstGeom prst="rect">
+            <a:avLst/>
+          </a:prstGeom>
+        </p:spPr>
+        <p:style>
+          <a:lnRef idx="2">
+            <a:schemeClr val="accent1"/>
+          </a:lnRef>
+          <a:fillRef idx="1">
+            <a:schemeClr val="lt1"/>
+          </a:fillRef>
+          <a:effectRef idx="0">
+            <a:schemeClr val="accent1"/>
+          </a:effectRef>
+          <a:fontRef idx="minor">
+            <a:schemeClr val="dk1"/>
+          </a:fontRef>
+        </p:style>
+        <p:txBody>
+          <a:bodyPr rtlCol="0" anchor="ctr"/>
+          <a:lstStyle/>
+          <a:p>
+            <a:pPr algn="ctr"/>
+            <a:endParaRPr lang="en-US"/>
+          </a:p>
+        </p:txBody>
+      </p:sp>
+      <p:sp>
+        <p:nvSpPr>
+          <p:cNvPr id="36" name="TextBox 35"/>
+          <p:cNvSpPr txBox="1"/>
+          <p:nvPr/>
+        </p:nvSpPr>
+        <p:spPr>
+          <a:xfrm>
+            <a:off x="4527389" y="3772026"/>
+            <a:ext cx="1162051" cy="646331"/>
+          </a:xfrm>
+          <a:prstGeom prst="rect">
+            <a:avLst/>
+          </a:prstGeom>
+          <a:noFill/>
+        </p:spPr>
+        <p:txBody>
+          <a:bodyPr wrap="square" rtlCol="0">
+            <a:spAutoFit/>
+          </a:bodyPr>
+          <a:lstStyle/>
+          <a:p>
+            <a:r>
+              <a:rPr lang="en-US" dirty="0" err="1" smtClean="0"/>
+              <a:t>ContainerAllocator</a:t>
+            </a:r>
+            <a:endParaRPr lang="en-US" dirty="0"/>
+          </a:p>
+        </p:txBody>
+      </p:sp>
+      <p:cxnSp>
+        <p:nvCxnSpPr>
+          <p:cNvPr id="37" name="Straight Arrow Connector 36"/>
+          <p:cNvCxnSpPr/>
+          <p:nvPr/>
+        </p:nvCxnSpPr>
+        <p:spPr>
+          <a:xfrm flipV="1">
+            <a:off x="2368049" y="3777768"/>
+            <a:ext cx="1950876" cy="4309"/>
+          </a:xfrm>
+          <a:prstGeom prst="straightConnector1">
+            <a:avLst/>
+          </a:prstGeom>
+          <a:ln>
+            <a:headEnd type="triangle"/>
+            <a:tailEnd type="triangle"/>
+          </a:ln>
+        </p:spPr>
+        <p:style>
+          <a:lnRef idx="1">
+            <a:schemeClr val="accent1"/>
+          </a:lnRef>
+          <a:fillRef idx="0">
+            <a:schemeClr val="accent1"/>
+          </a:fillRef>
+          <a:effectRef idx="0">
+            <a:schemeClr val="accent1"/>
+          </a:effectRef>
+          <a:fontRef idx="minor">
+            <a:schemeClr val="tx1"/>
+          </a:fontRef>
+        </p:style>
+      </p:cxnSp>
+      <p:sp>
+        <p:nvSpPr>
+          <p:cNvPr id="38" name="TextBox 37"/>
+          <p:cNvSpPr txBox="1"/>
+          <p:nvPr/>
+        </p:nvSpPr>
+        <p:spPr>
+          <a:xfrm>
+            <a:off x="213123" y="2976843"/>
+            <a:ext cx="2417885" cy="646331"/>
+          </a:xfrm>
+          <a:prstGeom prst="rect">
+            <a:avLst/>
+          </a:prstGeom>
+          <a:noFill/>
+        </p:spPr>
+        <p:txBody>
+          <a:bodyPr wrap="square" rtlCol="0">
+            <a:spAutoFit/>
+          </a:bodyPr>
+          <a:lstStyle/>
+          <a:p>
+            <a:r>
+              <a:rPr lang="en-US" altLang="zh-CN" dirty="0" smtClean="0"/>
+              <a:t>Translate requests for Yarn Resource Manager</a:t>
+            </a:r>
+            <a:endParaRPr lang="en-US" dirty="0"/>
+          </a:p>
+        </p:txBody>
+      </p:sp>
+      <p:sp>
+        <p:nvSpPr>
+          <p:cNvPr id="39" name="TextBox 38"/>
+          <p:cNvSpPr txBox="1"/>
+          <p:nvPr/>
+        </p:nvSpPr>
+        <p:spPr>
+          <a:xfrm>
+            <a:off x="6130629" y="4035214"/>
+            <a:ext cx="885821" cy="369332"/>
+          </a:xfrm>
+          <a:prstGeom prst="rect">
+            <a:avLst/>
+          </a:prstGeom>
+          <a:noFill/>
+        </p:spPr>
+        <p:txBody>
+          <a:bodyPr wrap="square" rtlCol="0">
+            <a:spAutoFit/>
+          </a:bodyPr>
+          <a:lstStyle/>
+          <a:p>
+            <a:r>
+              <a:rPr lang="en-US" dirty="0" smtClean="0"/>
+              <a:t>contain</a:t>
+            </a:r>
+            <a:endParaRPr lang="en-US" dirty="0"/>
+          </a:p>
+        </p:txBody>
+      </p:sp>
+      <p:sp>
+        <p:nvSpPr>
+          <p:cNvPr id="40" name="TextBox 39"/>
+          <p:cNvSpPr txBox="1"/>
+          <p:nvPr/>
+        </p:nvSpPr>
+        <p:spPr>
+          <a:xfrm>
+            <a:off x="2792913" y="3434444"/>
+            <a:ext cx="902681" cy="369332"/>
+          </a:xfrm>
+          <a:prstGeom prst="rect">
+            <a:avLst/>
+          </a:prstGeom>
+          <a:noFill/>
+        </p:spPr>
+        <p:txBody>
+          <a:bodyPr wrap="square" rtlCol="0">
+            <a:spAutoFit/>
+          </a:bodyPr>
+          <a:lstStyle/>
+          <a:p>
+            <a:r>
+              <a:rPr lang="en-US" dirty="0" smtClean="0"/>
+              <a:t>request</a:t>
+            </a:r>
+            <a:endParaRPr lang="en-US" dirty="0"/>
+          </a:p>
+        </p:txBody>
+      </p:sp>
+      <p:cxnSp>
+        <p:nvCxnSpPr>
+          <p:cNvPr id="41" name="Straight Arrow Connector 40"/>
+          <p:cNvCxnSpPr>
+            <a:stCxn id="29" idx="2"/>
+            <a:endCxn id="43" idx="0"/>
+          </p:cNvCxnSpPr>
+          <p:nvPr/>
+        </p:nvCxnSpPr>
+        <p:spPr>
+          <a:xfrm>
+            <a:off x="1448713" y="4547944"/>
+            <a:ext cx="1016641" cy="1311794"/>
+          </a:xfrm>
+          <a:prstGeom prst="straightConnector1">
+            <a:avLst/>
+          </a:prstGeom>
+          <a:ln>
+            <a:tailEnd type="triangle"/>
+          </a:ln>
+        </p:spPr>
+        <p:style>
+          <a:lnRef idx="1">
+            <a:schemeClr val="accent1"/>
+          </a:lnRef>
+          <a:fillRef idx="0">
+            <a:schemeClr val="accent1"/>
+          </a:fillRef>
+          <a:effectRef idx="0">
+            <a:schemeClr val="accent1"/>
+          </a:effectRef>
+          <a:fontRef idx="minor">
+            <a:schemeClr val="tx1"/>
+          </a:fontRef>
+        </p:style>
+      </p:cxnSp>
+      <p:sp>
+        <p:nvSpPr>
+          <p:cNvPr id="42" name="TextBox 41"/>
+          <p:cNvSpPr txBox="1"/>
+          <p:nvPr/>
+        </p:nvSpPr>
+        <p:spPr>
+          <a:xfrm rot="3055379">
+            <a:off x="877584" y="4932271"/>
+            <a:ext cx="1553837" cy="651105"/>
+          </a:xfrm>
+          <a:prstGeom prst="rect">
+            <a:avLst/>
+          </a:prstGeom>
+          <a:noFill/>
+        </p:spPr>
+        <p:txBody>
+          <a:bodyPr wrap="square" rtlCol="0">
+            <a:spAutoFit/>
+          </a:bodyPr>
+          <a:lstStyle/>
+          <a:p>
+            <a:r>
+              <a:rPr lang="en-US" dirty="0" err="1" smtClean="0"/>
+              <a:t>launchStreamProcessor</a:t>
+            </a:r>
+            <a:endParaRPr lang="en-US" dirty="0"/>
+          </a:p>
+        </p:txBody>
+      </p:sp>
+      <p:sp>
+        <p:nvSpPr>
+          <p:cNvPr id="43" name="Rectangle 42"/>
+          <p:cNvSpPr/>
+          <p:nvPr/>
+        </p:nvSpPr>
+        <p:spPr>
+          <a:xfrm>
+            <a:off x="1143511" y="5859738"/>
+            <a:ext cx="2643686" cy="664578"/>
+          </a:xfrm>
+          <a:prstGeom prst="rect">
+            <a:avLst/>
+          </a:prstGeom>
+        </p:spPr>
+        <p:style>
+          <a:lnRef idx="2">
+            <a:schemeClr val="accent1"/>
+          </a:lnRef>
+          <a:fillRef idx="1">
+            <a:schemeClr val="lt1"/>
+          </a:fillRef>
+          <a:effectRef idx="0">
+            <a:schemeClr val="accent1"/>
+          </a:effectRef>
+          <a:fontRef idx="minor">
+            <a:schemeClr val="dk1"/>
+          </a:fontRef>
+        </p:style>
+        <p:txBody>
+          <a:bodyPr rtlCol="0" anchor="ctr"/>
+          <a:lstStyle/>
+          <a:p>
+            <a:pPr algn="ctr"/>
+            <a:endParaRPr lang="en-US"/>
+          </a:p>
+        </p:txBody>
+      </p:sp>
+      <p:sp>
+        <p:nvSpPr>
+          <p:cNvPr id="44" name="TextBox 43"/>
+          <p:cNvSpPr txBox="1"/>
+          <p:nvPr/>
+        </p:nvSpPr>
+        <p:spPr>
+          <a:xfrm>
+            <a:off x="1309655" y="6007361"/>
+            <a:ext cx="2312377" cy="369332"/>
+          </a:xfrm>
+          <a:prstGeom prst="rect">
+            <a:avLst/>
+          </a:prstGeom>
+          <a:noFill/>
+        </p:spPr>
+        <p:txBody>
+          <a:bodyPr wrap="square" rtlCol="0">
+            <a:spAutoFit/>
+          </a:bodyPr>
+          <a:lstStyle/>
+          <a:p>
+            <a:r>
+              <a:rPr lang="en-US" dirty="0" err="1" smtClean="0"/>
+              <a:t>YarnContainerRunner</a:t>
+            </a:r>
+            <a:endParaRPr lang="en-US" dirty="0"/>
+          </a:p>
+        </p:txBody>
+      </p:sp>
+      <p:sp>
+        <p:nvSpPr>
+          <p:cNvPr id="45" name="Rectangle 44"/>
+          <p:cNvSpPr/>
+          <p:nvPr/>
+        </p:nvSpPr>
+        <p:spPr>
+          <a:xfrm>
+            <a:off x="2731432" y="4172608"/>
+            <a:ext cx="1217511" cy="551097"/>
+          </a:xfrm>
+          <a:prstGeom prst="rect">
+            <a:avLst/>
+          </a:prstGeom>
+        </p:spPr>
+        <p:style>
+          <a:lnRef idx="2">
+            <a:schemeClr val="accent1"/>
+          </a:lnRef>
+          <a:fillRef idx="1">
+            <a:schemeClr val="lt1"/>
+          </a:fillRef>
+          <a:effectRef idx="0">
+            <a:schemeClr val="accent1"/>
+          </a:effectRef>
+          <a:fontRef idx="minor">
+            <a:schemeClr val="dk1"/>
+          </a:fontRef>
+        </p:style>
+        <p:txBody>
+          <a:bodyPr rtlCol="0" anchor="ctr"/>
+          <a:lstStyle/>
+          <a:p>
+            <a:pPr algn="ctr"/>
+            <a:r>
+              <a:rPr lang="en-US" dirty="0" err="1" smtClean="0"/>
+              <a:t>commandBuilder</a:t>
+            </a:r>
+            <a:endParaRPr lang="en-US" dirty="0"/>
+          </a:p>
+        </p:txBody>
+      </p:sp>
+      <p:cxnSp>
+        <p:nvCxnSpPr>
+          <p:cNvPr id="46" name="Straight Arrow Connector 45"/>
+          <p:cNvCxnSpPr/>
+          <p:nvPr/>
+        </p:nvCxnSpPr>
+        <p:spPr>
+          <a:xfrm flipH="1" flipV="1">
+            <a:off x="2368609" y="4179718"/>
+            <a:ext cx="1950316" cy="4661"/>
+          </a:xfrm>
+          <a:prstGeom prst="straightConnector1">
+            <a:avLst/>
+          </a:prstGeom>
+          <a:ln>
+            <a:tailEnd type="triangle"/>
+          </a:ln>
+        </p:spPr>
+        <p:style>
+          <a:lnRef idx="1">
+            <a:schemeClr val="accent1"/>
+          </a:lnRef>
+          <a:fillRef idx="0">
+            <a:schemeClr val="accent1"/>
+          </a:fillRef>
+          <a:effectRef idx="0">
+            <a:schemeClr val="accent1"/>
+          </a:effectRef>
+          <a:fontRef idx="minor">
+            <a:schemeClr val="tx1"/>
+          </a:fontRef>
+        </p:style>
+      </p:cxnSp>
+      <p:sp>
+        <p:nvSpPr>
+          <p:cNvPr id="47" name="Rectangle 46"/>
+          <p:cNvSpPr/>
+          <p:nvPr/>
+        </p:nvSpPr>
+        <p:spPr>
+          <a:xfrm rot="3102295">
+            <a:off x="1753622" y="4852514"/>
+            <a:ext cx="1226377" cy="555110"/>
+          </a:xfrm>
+          <a:prstGeom prst="rect">
+            <a:avLst/>
+          </a:prstGeom>
+        </p:spPr>
+        <p:style>
+          <a:lnRef idx="2">
+            <a:schemeClr val="accent1"/>
+          </a:lnRef>
+          <a:fillRef idx="1">
+            <a:schemeClr val="lt1"/>
+          </a:fillRef>
+          <a:effectRef idx="0">
+            <a:schemeClr val="accent1"/>
+          </a:effectRef>
+          <a:fontRef idx="minor">
+            <a:schemeClr val="dk1"/>
+          </a:fontRef>
+        </p:style>
+        <p:txBody>
+          <a:bodyPr rtlCol="0" anchor="ctr"/>
+          <a:lstStyle/>
+          <a:p>
+            <a:pPr algn="ctr"/>
+            <a:r>
+              <a:rPr lang="en-US" dirty="0" err="1" smtClean="0"/>
+              <a:t>commandBuilder</a:t>
+            </a:r>
+            <a:endParaRPr lang="en-US" dirty="0"/>
+          </a:p>
+        </p:txBody>
+      </p:sp>
+      <p:cxnSp>
+        <p:nvCxnSpPr>
+          <p:cNvPr id="48" name="Straight Arrow Connector 47"/>
+          <p:cNvCxnSpPr>
+            <a:stCxn id="43" idx="3"/>
+            <a:endCxn id="49" idx="1"/>
+          </p:cNvCxnSpPr>
+          <p:nvPr/>
+        </p:nvCxnSpPr>
+        <p:spPr>
+          <a:xfrm>
+            <a:off x="3787197" y="6192027"/>
+            <a:ext cx="1399589" cy="0"/>
+          </a:xfrm>
+          <a:prstGeom prst="straightConnector1">
+            <a:avLst/>
+          </a:prstGeom>
+          <a:ln>
+            <a:tailEnd type="triangle"/>
+          </a:ln>
+        </p:spPr>
+        <p:style>
+          <a:lnRef idx="1">
+            <a:schemeClr val="accent1"/>
+          </a:lnRef>
+          <a:fillRef idx="0">
+            <a:schemeClr val="accent1"/>
+          </a:fillRef>
+          <a:effectRef idx="0">
+            <a:schemeClr val="accent1"/>
+          </a:effectRef>
+          <a:fontRef idx="minor">
+            <a:schemeClr val="tx1"/>
+          </a:fontRef>
+        </p:style>
+      </p:cxnSp>
+      <p:sp>
+        <p:nvSpPr>
+          <p:cNvPr id="49" name="Rectangle 48"/>
+          <p:cNvSpPr/>
+          <p:nvPr/>
+        </p:nvSpPr>
+        <p:spPr>
+          <a:xfrm>
+            <a:off x="5186786" y="5821530"/>
+            <a:ext cx="2285917" cy="740994"/>
+          </a:xfrm>
+          <a:prstGeom prst="rect">
+            <a:avLst/>
+          </a:prstGeom>
+          <a:ln>
+            <a:solidFill>
+              <a:srgbClr val="FF0000"/>
+            </a:solidFill>
+          </a:ln>
+        </p:spPr>
+        <p:style>
+          <a:lnRef idx="2">
+            <a:schemeClr val="accent1"/>
+          </a:lnRef>
+          <a:fillRef idx="1">
+            <a:schemeClr val="lt1"/>
+          </a:fillRef>
+          <a:effectRef idx="0">
+            <a:schemeClr val="accent1"/>
+          </a:effectRef>
+          <a:fontRef idx="minor">
+            <a:schemeClr val="dk1"/>
+          </a:fontRef>
+        </p:style>
+        <p:txBody>
+          <a:bodyPr rtlCol="0" anchor="ctr"/>
+          <a:lstStyle/>
+          <a:p>
+            <a:pPr algn="ctr"/>
+            <a:endParaRPr lang="en-US">
+              <a:solidFill>
+                <a:srgbClr val="FF0000"/>
+              </a:solidFill>
+            </a:endParaRPr>
+          </a:p>
+        </p:txBody>
+      </p:sp>
+      <p:sp>
+        <p:nvSpPr>
+          <p:cNvPr id="50" name="TextBox 49"/>
+          <p:cNvSpPr txBox="1"/>
+          <p:nvPr/>
+        </p:nvSpPr>
+        <p:spPr>
+          <a:xfrm>
+            <a:off x="5295526" y="6007361"/>
+            <a:ext cx="2290012" cy="369332"/>
+          </a:xfrm>
+          <a:prstGeom prst="rect">
+            <a:avLst/>
+          </a:prstGeom>
+          <a:noFill/>
+        </p:spPr>
+        <p:txBody>
+          <a:bodyPr wrap="square" rtlCol="0">
+            <a:spAutoFit/>
+          </a:bodyPr>
+          <a:lstStyle/>
+          <a:p>
+            <a:r>
+              <a:rPr lang="en-US" dirty="0" smtClean="0"/>
+              <a:t>YARN Node Manager</a:t>
+            </a:r>
+            <a:endParaRPr lang="en-US" dirty="0"/>
+          </a:p>
+        </p:txBody>
+      </p:sp>
+      <p:sp>
+        <p:nvSpPr>
+          <p:cNvPr id="51" name="Rectangle 50"/>
+          <p:cNvSpPr/>
+          <p:nvPr/>
+        </p:nvSpPr>
+        <p:spPr>
+          <a:xfrm>
+            <a:off x="8050768" y="1547055"/>
+            <a:ext cx="1490083" cy="451780"/>
+          </a:xfrm>
+          <a:prstGeom prst="rect">
+            <a:avLst/>
+          </a:prstGeom>
+        </p:spPr>
+        <p:style>
+          <a:lnRef idx="2">
+            <a:schemeClr val="accent1"/>
+          </a:lnRef>
+          <a:fillRef idx="1">
+            <a:schemeClr val="lt1"/>
+          </a:fillRef>
+          <a:effectRef idx="0">
+            <a:schemeClr val="accent1"/>
+          </a:effectRef>
+          <a:fontRef idx="minor">
+            <a:schemeClr val="dk1"/>
+          </a:fontRef>
+        </p:style>
+        <p:txBody>
+          <a:bodyPr rtlCol="0" anchor="ctr"/>
+          <a:lstStyle/>
+          <a:p>
+            <a:pPr algn="ctr"/>
+            <a:endParaRPr lang="en-US"/>
+          </a:p>
+        </p:txBody>
+      </p:sp>
+      <p:sp>
+        <p:nvSpPr>
+          <p:cNvPr id="52" name="TextBox 51"/>
+          <p:cNvSpPr txBox="1"/>
+          <p:nvPr/>
+        </p:nvSpPr>
+        <p:spPr>
+          <a:xfrm>
+            <a:off x="8131444" y="1588279"/>
+            <a:ext cx="1419524" cy="369332"/>
+          </a:xfrm>
+          <a:prstGeom prst="rect">
+            <a:avLst/>
+          </a:prstGeom>
+          <a:noFill/>
+        </p:spPr>
+        <p:txBody>
+          <a:bodyPr wrap="square" rtlCol="0">
+            <a:spAutoFit/>
+          </a:bodyPr>
+          <a:lstStyle/>
+          <a:p>
+            <a:r>
+              <a:rPr lang="en-US" dirty="0" err="1" smtClean="0"/>
+              <a:t>ClientHelper</a:t>
+            </a:r>
+            <a:endParaRPr lang="en-US" dirty="0"/>
+          </a:p>
+        </p:txBody>
+      </p:sp>
+      <p:cxnSp>
+        <p:nvCxnSpPr>
+          <p:cNvPr id="53" name="Straight Arrow Connector 52"/>
+          <p:cNvCxnSpPr>
+            <a:stCxn id="52" idx="3"/>
+            <a:endCxn id="15" idx="1"/>
+          </p:cNvCxnSpPr>
+          <p:nvPr/>
+        </p:nvCxnSpPr>
+        <p:spPr>
+          <a:xfrm flipV="1">
+            <a:off x="9550968" y="1759376"/>
+            <a:ext cx="538206" cy="13569"/>
+          </a:xfrm>
+          <a:prstGeom prst="straightConnector1">
+            <a:avLst/>
+          </a:prstGeom>
+          <a:ln>
+            <a:tailEnd type="triangle"/>
+          </a:ln>
+        </p:spPr>
+        <p:style>
+          <a:lnRef idx="1">
+            <a:schemeClr val="accent1"/>
+          </a:lnRef>
+          <a:fillRef idx="0">
+            <a:schemeClr val="accent1"/>
+          </a:fillRef>
+          <a:effectRef idx="0">
+            <a:schemeClr val="accent1"/>
+          </a:effectRef>
+          <a:fontRef idx="minor">
+            <a:schemeClr val="tx1"/>
+          </a:fontRef>
+        </p:style>
+      </p:cxnSp>
+      <p:sp>
+        <p:nvSpPr>
+          <p:cNvPr id="54" name="TextBox 53"/>
+          <p:cNvSpPr txBox="1"/>
+          <p:nvPr/>
+        </p:nvSpPr>
+        <p:spPr>
+          <a:xfrm>
+            <a:off x="7782663" y="757535"/>
+            <a:ext cx="2117086" cy="646331"/>
+          </a:xfrm>
+          <a:prstGeom prst="rect">
+            <a:avLst/>
+          </a:prstGeom>
+          <a:noFill/>
+        </p:spPr>
+        <p:txBody>
+          <a:bodyPr wrap="square" rtlCol="0">
+            <a:spAutoFit/>
+          </a:bodyPr>
+          <a:lstStyle/>
+          <a:p>
+            <a:r>
+              <a:rPr lang="en-US" dirty="0" smtClean="0"/>
+              <a:t>Wrap everything and submit to YARN</a:t>
+            </a:r>
+            <a:endParaRPr lang="en-US" dirty="0"/>
+          </a:p>
+        </p:txBody>
+      </p:sp>
+      <p:sp>
+        <p:nvSpPr>
+          <p:cNvPr id="55" name="TextBox 54"/>
+          <p:cNvSpPr txBox="1"/>
+          <p:nvPr/>
+        </p:nvSpPr>
+        <p:spPr>
+          <a:xfrm>
+            <a:off x="9331375" y="1958051"/>
+            <a:ext cx="1102739" cy="646331"/>
+          </a:xfrm>
+          <a:prstGeom prst="rect">
+            <a:avLst/>
+          </a:prstGeom>
+          <a:noFill/>
+        </p:spPr>
+        <p:txBody>
+          <a:bodyPr wrap="square" rtlCol="0">
+            <a:spAutoFit/>
+          </a:bodyPr>
+          <a:lstStyle/>
+          <a:p>
+            <a:r>
+              <a:rPr lang="en-US" dirty="0" smtClean="0"/>
+              <a:t>submit in context</a:t>
+            </a:r>
+            <a:endParaRPr lang="en-US" dirty="0"/>
+          </a:p>
+        </p:txBody>
+      </p:sp>
+      <p:sp>
+        <p:nvSpPr>
+          <p:cNvPr id="56" name="TextBox 55"/>
+          <p:cNvSpPr txBox="1"/>
+          <p:nvPr/>
+        </p:nvSpPr>
+        <p:spPr>
+          <a:xfrm>
+            <a:off x="2964644" y="4791808"/>
+            <a:ext cx="2222142" cy="923330"/>
+          </a:xfrm>
+          <a:prstGeom prst="rect">
+            <a:avLst/>
+          </a:prstGeom>
+          <a:noFill/>
+        </p:spPr>
+        <p:txBody>
+          <a:bodyPr wrap="square" rtlCol="0">
+            <a:spAutoFit/>
+          </a:bodyPr>
+          <a:lstStyle/>
+          <a:p>
+            <a:r>
+              <a:rPr lang="en-US" dirty="0" smtClean="0"/>
+              <a:t>tell which and how to run the </a:t>
+            </a:r>
+            <a:r>
+              <a:rPr lang="en-US" dirty="0" err="1" smtClean="0"/>
+              <a:t>samza</a:t>
+            </a:r>
+            <a:r>
+              <a:rPr lang="en-US" dirty="0" smtClean="0"/>
+              <a:t> container</a:t>
+            </a:r>
+            <a:endParaRPr lang="en-US" dirty="0"/>
+          </a:p>
+        </p:txBody>
+      </p:sp>
+    </p:spTree>
+    <p:extLst>
+      <p:ext uri="{BB962C8B-B14F-4D97-AF65-F5344CB8AC3E}">
+        <p14:creationId xmlns:p14="http://schemas.microsoft.com/office/powerpoint/2010/main" val="3595600313"/>
+      </p:ext>
+    </p:extLst>
+  </p:cSld>
+  <p:clrMapOvr>
+    <a:masterClrMapping/>
+  </p:clrMapOvr>
+</p:sld>
+</file>
+
+<file path=ppt/slides/slide7.xml><?xml version="1.0" encoding="utf-8"?>
+<p:sld xmlns:a="http://schemas.openxmlformats.org/drawingml/2006/main" xmlns:r="http://schemas.openxmlformats.org/officeDocument/2006/relationships" xmlns:p="http://schemas.openxmlformats.org/presentationml/2006/main">
+  <p:cSld>
+    <p:spTree>
+      <p:nvGrpSpPr>
+        <p:cNvPr id="1" name=""/>
+        <p:cNvGrpSpPr/>
+        <p:nvPr/>
+      </p:nvGrpSpPr>
+      <p:grpSpPr>
+        <a:xfrm>
+          <a:off x="0" y="0"/>
+          <a:ext cx="0" cy="0"/>
+          <a:chOff x="0" y="0"/>
+          <a:chExt cx="0" cy="0"/>
+        </a:xfrm>
+      </p:grpSpPr>
+      <p:sp>
+        <p:nvSpPr>
           <p:cNvPr id="2" name="Rectangle 1"/>
           <p:cNvSpPr/>
           <p:nvPr/>
@@ -10750,7 +13105,7 @@
 </p:sld>
 </file>
 
-<file path=ppt/slides/slide7.xml><?xml version="1.0" encoding="utf-8"?>
+<file path=ppt/slides/slide8.xml><?xml version="1.0" encoding="utf-8"?>
 <p:sld xmlns:a="http://schemas.openxmlformats.org/drawingml/2006/main" xmlns:r="http://schemas.openxmlformats.org/officeDocument/2006/relationships" xmlns:p="http://schemas.openxmlformats.org/presentationml/2006/main">
   <p:cSld>
     <p:spTree>
@@ -11546,7 +13901,7 @@
 </p:sld>
 </file>
 
-<file path=ppt/slides/slide8.xml><?xml version="1.0" encoding="utf-8"?>
+<file path=ppt/slides/slide9.xml><?xml version="1.0" encoding="utf-8"?>
 <p:sld xmlns:a="http://schemas.openxmlformats.org/drawingml/2006/main" xmlns:r="http://schemas.openxmlformats.org/officeDocument/2006/relationships" xmlns:p="http://schemas.openxmlformats.org/presentationml/2006/main">
   <p:cSld>
     <p:spTree>
@@ -12103,414 +14458,6 @@
     <p:extLst>
       <p:ext uri="{BB962C8B-B14F-4D97-AF65-F5344CB8AC3E}">
         <p14:creationId xmlns:p14="http://schemas.microsoft.com/office/powerpoint/2010/main" val="2821675269"/>
-      </p:ext>
-    </p:extLst>
-  </p:cSld>
-  <p:clrMapOvr>
-    <a:masterClrMapping/>
-  </p:clrMapOvr>
-</p:sld>
-</file>
-
-<file path=ppt/slides/slide9.xml><?xml version="1.0" encoding="utf-8"?>
-<p:sld xmlns:a="http://schemas.openxmlformats.org/drawingml/2006/main" xmlns:r="http://schemas.openxmlformats.org/officeDocument/2006/relationships" xmlns:p="http://schemas.openxmlformats.org/presentationml/2006/main">
-  <p:cSld>
-    <p:spTree>
-      <p:nvGrpSpPr>
-        <p:cNvPr id="1" name=""/>
-        <p:cNvGrpSpPr/>
-        <p:nvPr/>
-      </p:nvGrpSpPr>
-      <p:grpSpPr>
-        <a:xfrm>
-          <a:off x="0" y="0"/>
-          <a:ext cx="0" cy="0"/>
-          <a:chOff x="0" y="0"/>
-          <a:chExt cx="0" cy="0"/>
-        </a:xfrm>
-      </p:grpSpPr>
-      <p:sp>
-        <p:nvSpPr>
-          <p:cNvPr id="5" name="Rectangle 4"/>
-          <p:cNvSpPr/>
-          <p:nvPr/>
-        </p:nvSpPr>
-        <p:spPr>
-          <a:xfrm>
-            <a:off x="3540034" y="2508069"/>
-            <a:ext cx="4310743" cy="3213462"/>
-          </a:xfrm>
-          <a:prstGeom prst="rect">
-            <a:avLst/>
-          </a:prstGeom>
-        </p:spPr>
-        <p:style>
-          <a:lnRef idx="2">
-            <a:schemeClr val="accent1"/>
-          </a:lnRef>
-          <a:fillRef idx="1">
-            <a:schemeClr val="lt1"/>
-          </a:fillRef>
-          <a:effectRef idx="0">
-            <a:schemeClr val="accent1"/>
-          </a:effectRef>
-          <a:fontRef idx="minor">
-            <a:schemeClr val="dk1"/>
-          </a:fontRef>
-        </p:style>
-        <p:txBody>
-          <a:bodyPr rtlCol="0" anchor="ctr"/>
-          <a:lstStyle/>
-          <a:p>
-            <a:pPr algn="ctr"/>
-            <a:endParaRPr lang="en-US"/>
-          </a:p>
-        </p:txBody>
-      </p:sp>
-      <p:sp>
-        <p:nvSpPr>
-          <p:cNvPr id="2" name="Title 1"/>
-          <p:cNvSpPr>
-            <a:spLocks noGrp="1"/>
-          </p:cNvSpPr>
-          <p:nvPr>
-            <p:ph type="title"/>
-          </p:nvPr>
-        </p:nvSpPr>
-        <p:spPr/>
-        <p:txBody>
-          <a:bodyPr/>
-          <a:lstStyle/>
-          <a:p>
-            <a:r>
-              <a:rPr lang="en-US" altLang="zh-CN" dirty="0" smtClean="0"/>
-              <a:t>Task</a:t>
-            </a:r>
-            <a:endParaRPr lang="en-US" dirty="0"/>
-          </a:p>
-        </p:txBody>
-      </p:sp>
-      <p:sp>
-        <p:nvSpPr>
-          <p:cNvPr id="4" name="Rectangle 3"/>
-          <p:cNvSpPr/>
-          <p:nvPr/>
-        </p:nvSpPr>
-        <p:spPr>
-          <a:xfrm>
-            <a:off x="4180114" y="3435531"/>
-            <a:ext cx="3030582" cy="1258094"/>
-          </a:xfrm>
-          <a:prstGeom prst="rect">
-            <a:avLst/>
-          </a:prstGeom>
-        </p:spPr>
-        <p:style>
-          <a:lnRef idx="2">
-            <a:schemeClr val="accent1"/>
-          </a:lnRef>
-          <a:fillRef idx="1">
-            <a:schemeClr val="lt1"/>
-          </a:fillRef>
-          <a:effectRef idx="0">
-            <a:schemeClr val="accent1"/>
-          </a:effectRef>
-          <a:fontRef idx="minor">
-            <a:schemeClr val="dk1"/>
-          </a:fontRef>
-        </p:style>
-        <p:txBody>
-          <a:bodyPr rtlCol="0" anchor="ctr"/>
-          <a:lstStyle/>
-          <a:p>
-            <a:pPr algn="ctr"/>
-            <a:endParaRPr lang="en-US" dirty="0"/>
-          </a:p>
-        </p:txBody>
-      </p:sp>
-      <p:cxnSp>
-        <p:nvCxnSpPr>
-          <p:cNvPr id="7" name="Straight Arrow Connector 6"/>
-          <p:cNvCxnSpPr>
-            <a:endCxn id="4" idx="1"/>
-          </p:cNvCxnSpPr>
-          <p:nvPr/>
-        </p:nvCxnSpPr>
-        <p:spPr>
-          <a:xfrm>
-            <a:off x="1149531" y="4064578"/>
-            <a:ext cx="3030583" cy="0"/>
-          </a:xfrm>
-          <a:prstGeom prst="straightConnector1">
-            <a:avLst/>
-          </a:prstGeom>
-          <a:ln>
-            <a:tailEnd type="triangle"/>
-          </a:ln>
-        </p:spPr>
-        <p:style>
-          <a:lnRef idx="1">
-            <a:schemeClr val="accent1"/>
-          </a:lnRef>
-          <a:fillRef idx="0">
-            <a:schemeClr val="accent1"/>
-          </a:fillRef>
-          <a:effectRef idx="0">
-            <a:schemeClr val="accent1"/>
-          </a:effectRef>
-          <a:fontRef idx="minor">
-            <a:schemeClr val="tx1"/>
-          </a:fontRef>
-        </p:style>
-      </p:cxnSp>
-      <p:sp>
-        <p:nvSpPr>
-          <p:cNvPr id="8" name="Rectangle 7"/>
-          <p:cNvSpPr/>
-          <p:nvPr/>
-        </p:nvSpPr>
-        <p:spPr>
-          <a:xfrm>
-            <a:off x="1443445" y="3488797"/>
-            <a:ext cx="1776549" cy="496390"/>
-          </a:xfrm>
-          <a:prstGeom prst="rect">
-            <a:avLst/>
-          </a:prstGeom>
-        </p:spPr>
-        <p:style>
-          <a:lnRef idx="2">
-            <a:schemeClr val="accent1"/>
-          </a:lnRef>
-          <a:fillRef idx="1">
-            <a:schemeClr val="lt1"/>
-          </a:fillRef>
-          <a:effectRef idx="0">
-            <a:schemeClr val="accent1"/>
-          </a:effectRef>
-          <a:fontRef idx="minor">
-            <a:schemeClr val="dk1"/>
-          </a:fontRef>
-        </p:style>
-        <p:txBody>
-          <a:bodyPr rtlCol="0" anchor="ctr"/>
-          <a:lstStyle/>
-          <a:p>
-            <a:pPr algn="ctr"/>
-            <a:r>
-              <a:rPr lang="en-US" altLang="zh-CN" dirty="0" err="1" smtClean="0"/>
-              <a:t>Envolope</a:t>
-            </a:r>
-            <a:endParaRPr lang="en-US" dirty="0"/>
-          </a:p>
-        </p:txBody>
-      </p:sp>
-      <p:cxnSp>
-        <p:nvCxnSpPr>
-          <p:cNvPr id="10" name="Straight Arrow Connector 9"/>
-          <p:cNvCxnSpPr/>
-          <p:nvPr/>
-        </p:nvCxnSpPr>
-        <p:spPr>
-          <a:xfrm>
-            <a:off x="7057208" y="4064578"/>
-            <a:ext cx="2739935" cy="8643"/>
-          </a:xfrm>
-          <a:prstGeom prst="straightConnector1">
-            <a:avLst/>
-          </a:prstGeom>
-          <a:ln>
-            <a:tailEnd type="triangle"/>
-          </a:ln>
-        </p:spPr>
-        <p:style>
-          <a:lnRef idx="1">
-            <a:schemeClr val="accent1"/>
-          </a:lnRef>
-          <a:fillRef idx="0">
-            <a:schemeClr val="accent1"/>
-          </a:fillRef>
-          <a:effectRef idx="0">
-            <a:schemeClr val="accent1"/>
-          </a:effectRef>
-          <a:fontRef idx="minor">
-            <a:schemeClr val="tx1"/>
-          </a:fontRef>
-        </p:style>
-      </p:cxnSp>
-      <p:sp>
-        <p:nvSpPr>
-          <p:cNvPr id="11" name="Rectangle 10"/>
-          <p:cNvSpPr/>
-          <p:nvPr/>
-        </p:nvSpPr>
-        <p:spPr>
-          <a:xfrm>
-            <a:off x="5796640" y="3666668"/>
-            <a:ext cx="1260568" cy="795819"/>
-          </a:xfrm>
-          <a:prstGeom prst="rect">
-            <a:avLst/>
-          </a:prstGeom>
-        </p:spPr>
-        <p:style>
-          <a:lnRef idx="2">
-            <a:schemeClr val="accent1"/>
-          </a:lnRef>
-          <a:fillRef idx="1">
-            <a:schemeClr val="lt1"/>
-          </a:fillRef>
-          <a:effectRef idx="0">
-            <a:schemeClr val="accent1"/>
-          </a:effectRef>
-          <a:fontRef idx="minor">
-            <a:schemeClr val="dk1"/>
-          </a:fontRef>
-        </p:style>
-        <p:txBody>
-          <a:bodyPr rtlCol="0" anchor="ctr"/>
-          <a:lstStyle/>
-          <a:p>
-            <a:pPr algn="ctr"/>
-            <a:endParaRPr lang="en-US"/>
-          </a:p>
-        </p:txBody>
-      </p:sp>
-      <p:sp>
-        <p:nvSpPr>
-          <p:cNvPr id="12" name="TextBox 11"/>
-          <p:cNvSpPr txBox="1"/>
-          <p:nvPr/>
-        </p:nvSpPr>
-        <p:spPr>
-          <a:xfrm>
-            <a:off x="4232366" y="3853543"/>
-            <a:ext cx="1463039" cy="369332"/>
-          </a:xfrm>
-          <a:prstGeom prst="rect">
-            <a:avLst/>
-          </a:prstGeom>
-          <a:noFill/>
-        </p:spPr>
-        <p:txBody>
-          <a:bodyPr wrap="square" rtlCol="0">
-            <a:spAutoFit/>
-          </a:bodyPr>
-          <a:lstStyle/>
-          <a:p>
-            <a:r>
-              <a:rPr lang="en-US" altLang="zh-CN" dirty="0" err="1" smtClean="0"/>
-              <a:t>StreamTask</a:t>
-            </a:r>
-            <a:endParaRPr lang="en-US" dirty="0"/>
-          </a:p>
-        </p:txBody>
-      </p:sp>
-      <p:sp>
-        <p:nvSpPr>
-          <p:cNvPr id="13" name="TextBox 12"/>
-          <p:cNvSpPr txBox="1"/>
-          <p:nvPr/>
-        </p:nvSpPr>
-        <p:spPr>
-          <a:xfrm>
-            <a:off x="5901147" y="3750055"/>
-            <a:ext cx="1208314" cy="646331"/>
-          </a:xfrm>
-          <a:prstGeom prst="rect">
-            <a:avLst/>
-          </a:prstGeom>
-          <a:noFill/>
-        </p:spPr>
-        <p:txBody>
-          <a:bodyPr wrap="square" rtlCol="0">
-            <a:spAutoFit/>
-          </a:bodyPr>
-          <a:lstStyle/>
-          <a:p>
-            <a:r>
-              <a:rPr lang="en-US" dirty="0" smtClean="0"/>
-              <a:t>Output Collector</a:t>
-            </a:r>
-          </a:p>
-        </p:txBody>
-      </p:sp>
-      <p:sp>
-        <p:nvSpPr>
-          <p:cNvPr id="15" name="TextBox 14"/>
-          <p:cNvSpPr txBox="1"/>
-          <p:nvPr/>
-        </p:nvSpPr>
-        <p:spPr>
-          <a:xfrm>
-            <a:off x="4088674" y="2637682"/>
-            <a:ext cx="1606731" cy="369332"/>
-          </a:xfrm>
-          <a:prstGeom prst="rect">
-            <a:avLst/>
-          </a:prstGeom>
-          <a:noFill/>
-        </p:spPr>
-        <p:txBody>
-          <a:bodyPr wrap="square" rtlCol="0">
-            <a:spAutoFit/>
-          </a:bodyPr>
-          <a:lstStyle/>
-          <a:p>
-            <a:r>
-              <a:rPr lang="en-US" dirty="0" err="1" smtClean="0"/>
-              <a:t>SamzaJob</a:t>
-            </a:r>
-            <a:endParaRPr lang="en-US" dirty="0"/>
-          </a:p>
-        </p:txBody>
-      </p:sp>
-      <p:sp>
-        <p:nvSpPr>
-          <p:cNvPr id="16" name="Rectangle 15"/>
-          <p:cNvSpPr/>
-          <p:nvPr/>
-        </p:nvSpPr>
-        <p:spPr>
-          <a:xfrm>
-            <a:off x="7458889" y="3485816"/>
-            <a:ext cx="1776549" cy="496390"/>
-          </a:xfrm>
-          <a:prstGeom prst="rect">
-            <a:avLst/>
-          </a:prstGeom>
-        </p:spPr>
-        <p:style>
-          <a:lnRef idx="2">
-            <a:schemeClr val="accent1"/>
-          </a:lnRef>
-          <a:fillRef idx="1">
-            <a:schemeClr val="lt1"/>
-          </a:fillRef>
-          <a:effectRef idx="0">
-            <a:schemeClr val="accent1"/>
-          </a:effectRef>
-          <a:fontRef idx="minor">
-            <a:schemeClr val="dk1"/>
-          </a:fontRef>
-        </p:style>
-        <p:txBody>
-          <a:bodyPr rtlCol="0" anchor="ctr"/>
-          <a:lstStyle/>
-          <a:p>
-            <a:pPr algn="ctr"/>
-            <a:r>
-              <a:rPr lang="en-US" altLang="zh-CN" dirty="0" err="1" smtClean="0"/>
-              <a:t>Envolope</a:t>
-            </a:r>
-            <a:endParaRPr lang="en-US" dirty="0"/>
-          </a:p>
-        </p:txBody>
-      </p:sp>
-    </p:spTree>
-    <p:extLst>
-      <p:ext uri="{BB962C8B-B14F-4D97-AF65-F5344CB8AC3E}">
-        <p14:creationId xmlns:p14="http://schemas.microsoft.com/office/powerpoint/2010/main" val="2715910777"/>
       </p:ext>
     </p:extLst>
   </p:cSld>

</xml_diff>